<commit_message>
Add a call to decompose() in HHL to get algorithmic depth correct
</commit_message>
<xml_diff>
--- a/qc-app-oriented-benchmarks/_doc/images/benchmark_modules.pptx
+++ b/qc-app-oriented-benchmarks/_doc/images/benchmark_modules.pptx
@@ -5,7 +5,7 @@
     <p:sldMasterId id="2147483648" r:id="rId1"/>
   </p:sldMasterIdLst>
   <p:notesMasterIdLst>
-    <p:notesMasterId r:id="rId10"/>
+    <p:notesMasterId r:id="rId11"/>
   </p:notesMasterIdLst>
   <p:sldIdLst>
     <p:sldId id="288" r:id="rId2"/>
@@ -16,6 +16,7 @@
     <p:sldId id="293" r:id="rId7"/>
     <p:sldId id="294" r:id="rId8"/>
     <p:sldId id="295" r:id="rId9"/>
+    <p:sldId id="296" r:id="rId10"/>
   </p:sldIdLst>
   <p:sldSz cx="9144000" cy="6858000" type="screen4x3"/>
   <p:notesSz cx="6858000" cy="9144000"/>
@@ -215,7 +216,7 @@
           <a:p>
             <a:fld id="{84FBF2A6-D503-4454-8A1F-4B2613CCD2E6}" type="datetimeFigureOut">
               <a:rPr lang="en-US" smtClean="0"/>
-              <a:t>7/14/2023</a:t>
+              <a:t>1/23/2024</a:t>
             </a:fld>
             <a:endParaRPr lang="en-US"/>
           </a:p>
@@ -662,7 +663,7 @@
             <a:fld id="{1D8BD707-D9CF-40AE-B4C6-C98DA3205C09}" type="datetimeFigureOut">
               <a:rPr lang="en-US" smtClean="0"/>
               <a:pPr/>
-              <a:t>7/14/2023</a:t>
+              <a:t>1/23/2024</a:t>
             </a:fld>
             <a:endParaRPr lang="en-US"/>
           </a:p>
@@ -827,7 +828,7 @@
             <a:fld id="{1D8BD707-D9CF-40AE-B4C6-C98DA3205C09}" type="datetimeFigureOut">
               <a:rPr lang="en-US" smtClean="0"/>
               <a:pPr/>
-              <a:t>7/14/2023</a:t>
+              <a:t>1/23/2024</a:t>
             </a:fld>
             <a:endParaRPr lang="en-US"/>
           </a:p>
@@ -1002,7 +1003,7 @@
             <a:fld id="{1D8BD707-D9CF-40AE-B4C6-C98DA3205C09}" type="datetimeFigureOut">
               <a:rPr lang="en-US" smtClean="0"/>
               <a:pPr/>
-              <a:t>7/14/2023</a:t>
+              <a:t>1/23/2024</a:t>
             </a:fld>
             <a:endParaRPr lang="en-US"/>
           </a:p>
@@ -1167,7 +1168,7 @@
             <a:fld id="{1D8BD707-D9CF-40AE-B4C6-C98DA3205C09}" type="datetimeFigureOut">
               <a:rPr lang="en-US" smtClean="0"/>
               <a:pPr/>
-              <a:t>7/14/2023</a:t>
+              <a:t>1/23/2024</a:t>
             </a:fld>
             <a:endParaRPr lang="en-US"/>
           </a:p>
@@ -1409,7 +1410,7 @@
             <a:fld id="{1D8BD707-D9CF-40AE-B4C6-C98DA3205C09}" type="datetimeFigureOut">
               <a:rPr lang="en-US" smtClean="0"/>
               <a:pPr/>
-              <a:t>7/14/2023</a:t>
+              <a:t>1/23/2024</a:t>
             </a:fld>
             <a:endParaRPr lang="en-US"/>
           </a:p>
@@ -1691,7 +1692,7 @@
             <a:fld id="{1D8BD707-D9CF-40AE-B4C6-C98DA3205C09}" type="datetimeFigureOut">
               <a:rPr lang="en-US" smtClean="0"/>
               <a:pPr/>
-              <a:t>7/14/2023</a:t>
+              <a:t>1/23/2024</a:t>
             </a:fld>
             <a:endParaRPr lang="en-US"/>
           </a:p>
@@ -2107,7 +2108,7 @@
             <a:fld id="{1D8BD707-D9CF-40AE-B4C6-C98DA3205C09}" type="datetimeFigureOut">
               <a:rPr lang="en-US" smtClean="0"/>
               <a:pPr/>
-              <a:t>7/14/2023</a:t>
+              <a:t>1/23/2024</a:t>
             </a:fld>
             <a:endParaRPr lang="en-US"/>
           </a:p>
@@ -2221,7 +2222,7 @@
             <a:fld id="{1D8BD707-D9CF-40AE-B4C6-C98DA3205C09}" type="datetimeFigureOut">
               <a:rPr lang="en-US" smtClean="0"/>
               <a:pPr/>
-              <a:t>7/14/2023</a:t>
+              <a:t>1/23/2024</a:t>
             </a:fld>
             <a:endParaRPr lang="en-US"/>
           </a:p>
@@ -2313,7 +2314,7 @@
             <a:fld id="{1D8BD707-D9CF-40AE-B4C6-C98DA3205C09}" type="datetimeFigureOut">
               <a:rPr lang="en-US" smtClean="0"/>
               <a:pPr/>
-              <a:t>7/14/2023</a:t>
+              <a:t>1/23/2024</a:t>
             </a:fld>
             <a:endParaRPr lang="en-US"/>
           </a:p>
@@ -2585,7 +2586,7 @@
             <a:fld id="{1D8BD707-D9CF-40AE-B4C6-C98DA3205C09}" type="datetimeFigureOut">
               <a:rPr lang="en-US" smtClean="0"/>
               <a:pPr/>
-              <a:t>7/14/2023</a:t>
+              <a:t>1/23/2024</a:t>
             </a:fld>
             <a:endParaRPr lang="en-US"/>
           </a:p>
@@ -2834,7 +2835,7 @@
             <a:fld id="{1D8BD707-D9CF-40AE-B4C6-C98DA3205C09}" type="datetimeFigureOut">
               <a:rPr lang="en-US" smtClean="0"/>
               <a:pPr/>
-              <a:t>7/14/2023</a:t>
+              <a:t>1/23/2024</a:t>
             </a:fld>
             <a:endParaRPr lang="en-US"/>
           </a:p>
@@ -3042,7 +3043,7 @@
             <a:fld id="{1D8BD707-D9CF-40AE-B4C6-C98DA3205C09}" type="datetimeFigureOut">
               <a:rPr lang="en-US" smtClean="0"/>
               <a:pPr/>
-              <a:t>7/14/2023</a:t>
+              <a:t>1/23/2024</a:t>
             </a:fld>
             <a:endParaRPr lang="en-US"/>
           </a:p>
@@ -18508,6 +18509,4173 @@
 </p:sld>
 </file>
 
+<file path=ppt/slides/slide9.xml><?xml version="1.0" encoding="utf-8"?>
+<p:sld xmlns:a="http://schemas.openxmlformats.org/drawingml/2006/main" xmlns:r="http://schemas.openxmlformats.org/officeDocument/2006/relationships" xmlns:p="http://schemas.openxmlformats.org/presentationml/2006/main">
+  <p:cSld>
+    <p:spTree>
+      <p:nvGrpSpPr>
+        <p:cNvPr id="1" name=""/>
+        <p:cNvGrpSpPr/>
+        <p:nvPr/>
+      </p:nvGrpSpPr>
+      <p:grpSpPr>
+        <a:xfrm>
+          <a:off x="0" y="0"/>
+          <a:ext cx="0" cy="0"/>
+          <a:chOff x="0" y="0"/>
+          <a:chExt cx="0" cy="0"/>
+        </a:xfrm>
+      </p:grpSpPr>
+      <p:grpSp>
+        <p:nvGrpSpPr>
+          <p:cNvPr id="100" name="Group 99">
+            <a:extLst>
+              <a:ext uri="{FF2B5EF4-FFF2-40B4-BE49-F238E27FC236}">
+                <a16:creationId xmlns:a16="http://schemas.microsoft.com/office/drawing/2014/main" id="{E5025ADC-9AA0-778A-16BD-C2164EECF335}"/>
+              </a:ext>
+            </a:extLst>
+          </p:cNvPr>
+          <p:cNvGrpSpPr/>
+          <p:nvPr/>
+        </p:nvGrpSpPr>
+        <p:grpSpPr>
+          <a:xfrm>
+            <a:off x="5417819" y="1889760"/>
+            <a:ext cx="2362200" cy="1676400"/>
+            <a:chOff x="5334000" y="3733800"/>
+            <a:chExt cx="2362200" cy="1676400"/>
+          </a:xfrm>
+        </p:grpSpPr>
+        <p:sp>
+          <p:nvSpPr>
+            <p:cNvPr id="102" name="Rectangle 101">
+              <a:extLst>
+                <a:ext uri="{FF2B5EF4-FFF2-40B4-BE49-F238E27FC236}">
+                  <a16:creationId xmlns:a16="http://schemas.microsoft.com/office/drawing/2014/main" id="{2D7367B7-8148-FA55-0853-A60D03B62F56}"/>
+                </a:ext>
+              </a:extLst>
+            </p:cNvPr>
+            <p:cNvSpPr/>
+            <p:nvPr/>
+          </p:nvSpPr>
+          <p:spPr>
+            <a:xfrm>
+              <a:off x="5334000" y="4602481"/>
+              <a:ext cx="45719" cy="45719"/>
+            </a:xfrm>
+            <a:prstGeom prst="rect">
+              <a:avLst/>
+            </a:prstGeom>
+          </p:spPr>
+          <p:style>
+            <a:lnRef idx="2">
+              <a:schemeClr val="accent1">
+                <a:shade val="15000"/>
+              </a:schemeClr>
+            </a:lnRef>
+            <a:fillRef idx="1">
+              <a:schemeClr val="accent1"/>
+            </a:fillRef>
+            <a:effectRef idx="0">
+              <a:schemeClr val="accent1"/>
+            </a:effectRef>
+            <a:fontRef idx="minor">
+              <a:schemeClr val="lt1"/>
+            </a:fontRef>
+          </p:style>
+          <p:txBody>
+            <a:bodyPr rtlCol="0" anchor="ctr"/>
+            <a:lstStyle/>
+            <a:p>
+              <a:pPr algn="ctr"/>
+              <a:endParaRPr lang="en-US"/>
+            </a:p>
+          </p:txBody>
+        </p:sp>
+        <p:sp>
+          <p:nvSpPr>
+            <p:cNvPr id="103" name="Rectangle 102">
+              <a:extLst>
+                <a:ext uri="{FF2B5EF4-FFF2-40B4-BE49-F238E27FC236}">
+                  <a16:creationId xmlns:a16="http://schemas.microsoft.com/office/drawing/2014/main" id="{EDD349F1-65A7-53E0-B20F-27BCD908F089}"/>
+                </a:ext>
+              </a:extLst>
+            </p:cNvPr>
+            <p:cNvSpPr/>
+            <p:nvPr/>
+          </p:nvSpPr>
+          <p:spPr>
+            <a:xfrm>
+              <a:off x="6355081" y="3967732"/>
+              <a:ext cx="45719" cy="45719"/>
+            </a:xfrm>
+            <a:prstGeom prst="rect">
+              <a:avLst/>
+            </a:prstGeom>
+          </p:spPr>
+          <p:style>
+            <a:lnRef idx="2">
+              <a:schemeClr val="accent1">
+                <a:shade val="15000"/>
+              </a:schemeClr>
+            </a:lnRef>
+            <a:fillRef idx="1">
+              <a:schemeClr val="accent1"/>
+            </a:fillRef>
+            <a:effectRef idx="0">
+              <a:schemeClr val="accent1"/>
+            </a:effectRef>
+            <a:fontRef idx="minor">
+              <a:schemeClr val="lt1"/>
+            </a:fontRef>
+          </p:style>
+          <p:txBody>
+            <a:bodyPr rtlCol="0" anchor="ctr"/>
+            <a:lstStyle/>
+            <a:p>
+              <a:pPr algn="ctr"/>
+              <a:endParaRPr lang="en-US"/>
+            </a:p>
+          </p:txBody>
+        </p:sp>
+        <p:sp>
+          <p:nvSpPr>
+            <p:cNvPr id="108" name="Rectangle 107">
+              <a:extLst>
+                <a:ext uri="{FF2B5EF4-FFF2-40B4-BE49-F238E27FC236}">
+                  <a16:creationId xmlns:a16="http://schemas.microsoft.com/office/drawing/2014/main" id="{426D343B-F4C1-61B0-3B90-9C8F96721236}"/>
+                </a:ext>
+              </a:extLst>
+            </p:cNvPr>
+            <p:cNvSpPr/>
+            <p:nvPr/>
+          </p:nvSpPr>
+          <p:spPr>
+            <a:xfrm>
+              <a:off x="7193281" y="3733800"/>
+              <a:ext cx="45719" cy="45719"/>
+            </a:xfrm>
+            <a:prstGeom prst="rect">
+              <a:avLst/>
+            </a:prstGeom>
+          </p:spPr>
+          <p:style>
+            <a:lnRef idx="2">
+              <a:schemeClr val="accent1">
+                <a:shade val="15000"/>
+              </a:schemeClr>
+            </a:lnRef>
+            <a:fillRef idx="1">
+              <a:schemeClr val="accent1"/>
+            </a:fillRef>
+            <a:effectRef idx="0">
+              <a:schemeClr val="accent1"/>
+            </a:effectRef>
+            <a:fontRef idx="minor">
+              <a:schemeClr val="lt1"/>
+            </a:fontRef>
+          </p:style>
+          <p:txBody>
+            <a:bodyPr rtlCol="0" anchor="ctr"/>
+            <a:lstStyle/>
+            <a:p>
+              <a:pPr algn="ctr"/>
+              <a:endParaRPr lang="en-US"/>
+            </a:p>
+          </p:txBody>
+        </p:sp>
+        <p:sp>
+          <p:nvSpPr>
+            <p:cNvPr id="109" name="Rectangle 108">
+              <a:extLst>
+                <a:ext uri="{FF2B5EF4-FFF2-40B4-BE49-F238E27FC236}">
+                  <a16:creationId xmlns:a16="http://schemas.microsoft.com/office/drawing/2014/main" id="{4D8E77A8-7003-3B27-ED48-C919E7DA7C12}"/>
+                </a:ext>
+              </a:extLst>
+            </p:cNvPr>
+            <p:cNvSpPr/>
+            <p:nvPr/>
+          </p:nvSpPr>
+          <p:spPr>
+            <a:xfrm>
+              <a:off x="7650481" y="4631484"/>
+              <a:ext cx="45719" cy="45719"/>
+            </a:xfrm>
+            <a:prstGeom prst="rect">
+              <a:avLst/>
+            </a:prstGeom>
+          </p:spPr>
+          <p:style>
+            <a:lnRef idx="2">
+              <a:schemeClr val="accent1">
+                <a:shade val="15000"/>
+              </a:schemeClr>
+            </a:lnRef>
+            <a:fillRef idx="1">
+              <a:schemeClr val="accent1"/>
+            </a:fillRef>
+            <a:effectRef idx="0">
+              <a:schemeClr val="accent1"/>
+            </a:effectRef>
+            <a:fontRef idx="minor">
+              <a:schemeClr val="lt1"/>
+            </a:fontRef>
+          </p:style>
+          <p:txBody>
+            <a:bodyPr rtlCol="0" anchor="ctr"/>
+            <a:lstStyle/>
+            <a:p>
+              <a:pPr algn="ctr"/>
+              <a:endParaRPr lang="en-US"/>
+            </a:p>
+          </p:txBody>
+        </p:sp>
+        <p:sp>
+          <p:nvSpPr>
+            <p:cNvPr id="110" name="Rectangle 109">
+              <a:extLst>
+                <a:ext uri="{FF2B5EF4-FFF2-40B4-BE49-F238E27FC236}">
+                  <a16:creationId xmlns:a16="http://schemas.microsoft.com/office/drawing/2014/main" id="{6509E144-FDE5-DADA-53AC-76EB27698F6F}"/>
+                </a:ext>
+              </a:extLst>
+            </p:cNvPr>
+            <p:cNvSpPr/>
+            <p:nvPr/>
+          </p:nvSpPr>
+          <p:spPr>
+            <a:xfrm>
+              <a:off x="5759143" y="5364481"/>
+              <a:ext cx="45719" cy="45719"/>
+            </a:xfrm>
+            <a:prstGeom prst="rect">
+              <a:avLst/>
+            </a:prstGeom>
+          </p:spPr>
+          <p:style>
+            <a:lnRef idx="2">
+              <a:schemeClr val="accent1">
+                <a:shade val="15000"/>
+              </a:schemeClr>
+            </a:lnRef>
+            <a:fillRef idx="1">
+              <a:schemeClr val="accent1"/>
+            </a:fillRef>
+            <a:effectRef idx="0">
+              <a:schemeClr val="accent1"/>
+            </a:effectRef>
+            <a:fontRef idx="minor">
+              <a:schemeClr val="lt1"/>
+            </a:fontRef>
+          </p:style>
+          <p:txBody>
+            <a:bodyPr rtlCol="0" anchor="ctr"/>
+            <a:lstStyle/>
+            <a:p>
+              <a:pPr algn="ctr"/>
+              <a:endParaRPr lang="en-US"/>
+            </a:p>
+          </p:txBody>
+        </p:sp>
+        <p:sp>
+          <p:nvSpPr>
+            <p:cNvPr id="111" name="Rectangle 110">
+              <a:extLst>
+                <a:ext uri="{FF2B5EF4-FFF2-40B4-BE49-F238E27FC236}">
+                  <a16:creationId xmlns:a16="http://schemas.microsoft.com/office/drawing/2014/main" id="{2A6CA2A0-952E-9B0F-9B28-61A4079A5934}"/>
+                </a:ext>
+              </a:extLst>
+            </p:cNvPr>
+            <p:cNvSpPr/>
+            <p:nvPr/>
+          </p:nvSpPr>
+          <p:spPr>
+            <a:xfrm>
+              <a:off x="6096000" y="4743367"/>
+              <a:ext cx="45719" cy="45719"/>
+            </a:xfrm>
+            <a:prstGeom prst="rect">
+              <a:avLst/>
+            </a:prstGeom>
+          </p:spPr>
+          <p:style>
+            <a:lnRef idx="2">
+              <a:schemeClr val="accent1">
+                <a:shade val="15000"/>
+              </a:schemeClr>
+            </a:lnRef>
+            <a:fillRef idx="1">
+              <a:schemeClr val="accent1"/>
+            </a:fillRef>
+            <a:effectRef idx="0">
+              <a:schemeClr val="accent1"/>
+            </a:effectRef>
+            <a:fontRef idx="minor">
+              <a:schemeClr val="lt1"/>
+            </a:fontRef>
+          </p:style>
+          <p:txBody>
+            <a:bodyPr rtlCol="0" anchor="ctr"/>
+            <a:lstStyle/>
+            <a:p>
+              <a:pPr algn="ctr"/>
+              <a:endParaRPr lang="en-US"/>
+            </a:p>
+          </p:txBody>
+        </p:sp>
+        <p:sp>
+          <p:nvSpPr>
+            <p:cNvPr id="112" name="Rectangle 111">
+              <a:extLst>
+                <a:ext uri="{FF2B5EF4-FFF2-40B4-BE49-F238E27FC236}">
+                  <a16:creationId xmlns:a16="http://schemas.microsoft.com/office/drawing/2014/main" id="{9D11B52F-E1C2-7CBC-0FE1-C06C04547037}"/>
+                </a:ext>
+              </a:extLst>
+            </p:cNvPr>
+            <p:cNvSpPr/>
+            <p:nvPr/>
+          </p:nvSpPr>
+          <p:spPr>
+            <a:xfrm>
+              <a:off x="6991272" y="5023937"/>
+              <a:ext cx="45719" cy="45719"/>
+            </a:xfrm>
+            <a:prstGeom prst="rect">
+              <a:avLst/>
+            </a:prstGeom>
+          </p:spPr>
+          <p:style>
+            <a:lnRef idx="2">
+              <a:schemeClr val="accent1">
+                <a:shade val="15000"/>
+              </a:schemeClr>
+            </a:lnRef>
+            <a:fillRef idx="1">
+              <a:schemeClr val="accent1"/>
+            </a:fillRef>
+            <a:effectRef idx="0">
+              <a:schemeClr val="accent1"/>
+            </a:effectRef>
+            <a:fontRef idx="minor">
+              <a:schemeClr val="lt1"/>
+            </a:fontRef>
+          </p:style>
+          <p:txBody>
+            <a:bodyPr rtlCol="0" anchor="ctr"/>
+            <a:lstStyle/>
+            <a:p>
+              <a:pPr algn="ctr"/>
+              <a:endParaRPr lang="en-US"/>
+            </a:p>
+          </p:txBody>
+        </p:sp>
+        <p:sp>
+          <p:nvSpPr>
+            <p:cNvPr id="113" name="Rectangle 112">
+              <a:extLst>
+                <a:ext uri="{FF2B5EF4-FFF2-40B4-BE49-F238E27FC236}">
+                  <a16:creationId xmlns:a16="http://schemas.microsoft.com/office/drawing/2014/main" id="{9CA1166D-E23D-5DDC-116C-826D954E390B}"/>
+                </a:ext>
+              </a:extLst>
+            </p:cNvPr>
+            <p:cNvSpPr/>
+            <p:nvPr/>
+          </p:nvSpPr>
+          <p:spPr>
+            <a:xfrm>
+              <a:off x="7036991" y="4402884"/>
+              <a:ext cx="45719" cy="45719"/>
+            </a:xfrm>
+            <a:prstGeom prst="rect">
+              <a:avLst/>
+            </a:prstGeom>
+          </p:spPr>
+          <p:style>
+            <a:lnRef idx="2">
+              <a:schemeClr val="accent1">
+                <a:shade val="15000"/>
+              </a:schemeClr>
+            </a:lnRef>
+            <a:fillRef idx="1">
+              <a:schemeClr val="accent1"/>
+            </a:fillRef>
+            <a:effectRef idx="0">
+              <a:schemeClr val="accent1"/>
+            </a:effectRef>
+            <a:fontRef idx="minor">
+              <a:schemeClr val="lt1"/>
+            </a:fontRef>
+          </p:style>
+          <p:txBody>
+            <a:bodyPr rtlCol="0" anchor="ctr"/>
+            <a:lstStyle/>
+            <a:p>
+              <a:pPr algn="ctr"/>
+              <a:endParaRPr lang="en-US"/>
+            </a:p>
+          </p:txBody>
+        </p:sp>
+        <p:cxnSp>
+          <p:nvCxnSpPr>
+            <p:cNvPr id="114" name="Straight Connector 113">
+              <a:extLst>
+                <a:ext uri="{FF2B5EF4-FFF2-40B4-BE49-F238E27FC236}">
+                  <a16:creationId xmlns:a16="http://schemas.microsoft.com/office/drawing/2014/main" id="{D74E38C4-AEE2-CFA5-AC9F-78ED9583F13A}"/>
+                </a:ext>
+              </a:extLst>
+            </p:cNvPr>
+            <p:cNvCxnSpPr>
+              <a:cxnSpLocks/>
+              <a:stCxn id="102" idx="3"/>
+              <a:endCxn id="103" idx="1"/>
+            </p:cNvCxnSpPr>
+            <p:nvPr/>
+          </p:nvCxnSpPr>
+          <p:spPr>
+            <a:xfrm flipV="1">
+              <a:off x="5379719" y="3990592"/>
+              <a:ext cx="975362" cy="634749"/>
+            </a:xfrm>
+            <a:prstGeom prst="line">
+              <a:avLst/>
+            </a:prstGeom>
+            <a:ln w="25400">
+              <a:solidFill>
+                <a:srgbClr val="C00000"/>
+              </a:solidFill>
+            </a:ln>
+          </p:spPr>
+          <p:style>
+            <a:lnRef idx="1">
+              <a:schemeClr val="accent1"/>
+            </a:lnRef>
+            <a:fillRef idx="0">
+              <a:schemeClr val="accent1"/>
+            </a:fillRef>
+            <a:effectRef idx="0">
+              <a:schemeClr val="accent1"/>
+            </a:effectRef>
+            <a:fontRef idx="minor">
+              <a:schemeClr val="tx1"/>
+            </a:fontRef>
+          </p:style>
+        </p:cxnSp>
+        <p:cxnSp>
+          <p:nvCxnSpPr>
+            <p:cNvPr id="115" name="Straight Connector 114">
+              <a:extLst>
+                <a:ext uri="{FF2B5EF4-FFF2-40B4-BE49-F238E27FC236}">
+                  <a16:creationId xmlns:a16="http://schemas.microsoft.com/office/drawing/2014/main" id="{12D91782-E1AE-E916-BC9E-7AEB39EA4583}"/>
+                </a:ext>
+              </a:extLst>
+            </p:cNvPr>
+            <p:cNvCxnSpPr>
+              <a:cxnSpLocks/>
+              <a:stCxn id="103" idx="3"/>
+              <a:endCxn id="108" idx="1"/>
+            </p:cNvCxnSpPr>
+            <p:nvPr/>
+          </p:nvCxnSpPr>
+          <p:spPr>
+            <a:xfrm flipV="1">
+              <a:off x="6400800" y="3756660"/>
+              <a:ext cx="792481" cy="233932"/>
+            </a:xfrm>
+            <a:prstGeom prst="line">
+              <a:avLst/>
+            </a:prstGeom>
+            <a:ln w="25400">
+              <a:solidFill>
+                <a:srgbClr val="C00000"/>
+              </a:solidFill>
+            </a:ln>
+          </p:spPr>
+          <p:style>
+            <a:lnRef idx="1">
+              <a:schemeClr val="accent1"/>
+            </a:lnRef>
+            <a:fillRef idx="0">
+              <a:schemeClr val="accent1"/>
+            </a:fillRef>
+            <a:effectRef idx="0">
+              <a:schemeClr val="accent1"/>
+            </a:effectRef>
+            <a:fontRef idx="minor">
+              <a:schemeClr val="tx1"/>
+            </a:fontRef>
+          </p:style>
+        </p:cxnSp>
+        <p:cxnSp>
+          <p:nvCxnSpPr>
+            <p:cNvPr id="116" name="Straight Connector 115">
+              <a:extLst>
+                <a:ext uri="{FF2B5EF4-FFF2-40B4-BE49-F238E27FC236}">
+                  <a16:creationId xmlns:a16="http://schemas.microsoft.com/office/drawing/2014/main" id="{7754038A-5B56-7549-903A-6EA77E3CC2E1}"/>
+                </a:ext>
+              </a:extLst>
+            </p:cNvPr>
+            <p:cNvCxnSpPr>
+              <a:cxnSpLocks/>
+              <a:stCxn id="109" idx="2"/>
+              <a:endCxn id="108" idx="3"/>
+            </p:cNvCxnSpPr>
+            <p:nvPr/>
+          </p:nvCxnSpPr>
+          <p:spPr>
+            <a:xfrm flipH="1" flipV="1">
+              <a:off x="7239000" y="3756660"/>
+              <a:ext cx="434341" cy="920543"/>
+            </a:xfrm>
+            <a:prstGeom prst="line">
+              <a:avLst/>
+            </a:prstGeom>
+            <a:ln w="25400">
+              <a:solidFill>
+                <a:srgbClr val="C00000"/>
+              </a:solidFill>
+            </a:ln>
+          </p:spPr>
+          <p:style>
+            <a:lnRef idx="1">
+              <a:schemeClr val="accent1"/>
+            </a:lnRef>
+            <a:fillRef idx="0">
+              <a:schemeClr val="accent1"/>
+            </a:fillRef>
+            <a:effectRef idx="0">
+              <a:schemeClr val="accent1"/>
+            </a:effectRef>
+            <a:fontRef idx="minor">
+              <a:schemeClr val="tx1"/>
+            </a:fontRef>
+          </p:style>
+        </p:cxnSp>
+        <p:cxnSp>
+          <p:nvCxnSpPr>
+            <p:cNvPr id="117" name="Straight Connector 116">
+              <a:extLst>
+                <a:ext uri="{FF2B5EF4-FFF2-40B4-BE49-F238E27FC236}">
+                  <a16:creationId xmlns:a16="http://schemas.microsoft.com/office/drawing/2014/main" id="{EC297E3E-890B-19DA-CF0F-B0D8D06AE6DE}"/>
+                </a:ext>
+              </a:extLst>
+            </p:cNvPr>
+            <p:cNvCxnSpPr>
+              <a:cxnSpLocks/>
+              <a:stCxn id="113" idx="2"/>
+              <a:endCxn id="108" idx="2"/>
+            </p:cNvCxnSpPr>
+            <p:nvPr/>
+          </p:nvCxnSpPr>
+          <p:spPr>
+            <a:xfrm flipV="1">
+              <a:off x="7059851" y="3779519"/>
+              <a:ext cx="156290" cy="669084"/>
+            </a:xfrm>
+            <a:prstGeom prst="line">
+              <a:avLst/>
+            </a:prstGeom>
+            <a:ln w="25400">
+              <a:solidFill>
+                <a:schemeClr val="tx1">
+                  <a:lumMod val="95000"/>
+                  <a:lumOff val="5000"/>
+                </a:schemeClr>
+              </a:solidFill>
+              <a:prstDash val="sysDash"/>
+            </a:ln>
+          </p:spPr>
+          <p:style>
+            <a:lnRef idx="1">
+              <a:schemeClr val="accent1"/>
+            </a:lnRef>
+            <a:fillRef idx="0">
+              <a:schemeClr val="accent1"/>
+            </a:fillRef>
+            <a:effectRef idx="0">
+              <a:schemeClr val="accent1"/>
+            </a:effectRef>
+            <a:fontRef idx="minor">
+              <a:schemeClr val="tx1"/>
+            </a:fontRef>
+          </p:style>
+        </p:cxnSp>
+        <p:cxnSp>
+          <p:nvCxnSpPr>
+            <p:cNvPr id="118" name="Straight Connector 117">
+              <a:extLst>
+                <a:ext uri="{FF2B5EF4-FFF2-40B4-BE49-F238E27FC236}">
+                  <a16:creationId xmlns:a16="http://schemas.microsoft.com/office/drawing/2014/main" id="{F6E113BD-7792-EDD6-4578-D0C6E6685277}"/>
+                </a:ext>
+              </a:extLst>
+            </p:cNvPr>
+            <p:cNvCxnSpPr>
+              <a:cxnSpLocks/>
+              <a:stCxn id="109" idx="2"/>
+            </p:cNvCxnSpPr>
+            <p:nvPr/>
+          </p:nvCxnSpPr>
+          <p:spPr>
+            <a:xfrm flipH="1" flipV="1">
+              <a:off x="7107603" y="4414339"/>
+              <a:ext cx="565738" cy="262864"/>
+            </a:xfrm>
+            <a:prstGeom prst="line">
+              <a:avLst/>
+            </a:prstGeom>
+            <a:ln w="25400">
+              <a:solidFill>
+                <a:srgbClr val="C00000"/>
+              </a:solidFill>
+            </a:ln>
+          </p:spPr>
+          <p:style>
+            <a:lnRef idx="1">
+              <a:schemeClr val="accent1"/>
+            </a:lnRef>
+            <a:fillRef idx="0">
+              <a:schemeClr val="accent1"/>
+            </a:fillRef>
+            <a:effectRef idx="0">
+              <a:schemeClr val="accent1"/>
+            </a:effectRef>
+            <a:fontRef idx="minor">
+              <a:schemeClr val="tx1"/>
+            </a:fontRef>
+          </p:style>
+        </p:cxnSp>
+        <p:cxnSp>
+          <p:nvCxnSpPr>
+            <p:cNvPr id="119" name="Straight Connector 118">
+              <a:extLst>
+                <a:ext uri="{FF2B5EF4-FFF2-40B4-BE49-F238E27FC236}">
+                  <a16:creationId xmlns:a16="http://schemas.microsoft.com/office/drawing/2014/main" id="{339F8381-C616-CDBC-1B77-E1B1136ADD90}"/>
+                </a:ext>
+              </a:extLst>
+            </p:cNvPr>
+            <p:cNvCxnSpPr>
+              <a:cxnSpLocks/>
+              <a:stCxn id="112" idx="2"/>
+              <a:endCxn id="103" idx="2"/>
+            </p:cNvCxnSpPr>
+            <p:nvPr/>
+          </p:nvCxnSpPr>
+          <p:spPr>
+            <a:xfrm flipH="1" flipV="1">
+              <a:off x="6377941" y="4013451"/>
+              <a:ext cx="636191" cy="1056205"/>
+            </a:xfrm>
+            <a:prstGeom prst="line">
+              <a:avLst/>
+            </a:prstGeom>
+            <a:ln w="25400">
+              <a:solidFill>
+                <a:srgbClr val="C00000"/>
+              </a:solidFill>
+            </a:ln>
+          </p:spPr>
+          <p:style>
+            <a:lnRef idx="1">
+              <a:schemeClr val="accent1"/>
+            </a:lnRef>
+            <a:fillRef idx="0">
+              <a:schemeClr val="accent1"/>
+            </a:fillRef>
+            <a:effectRef idx="0">
+              <a:schemeClr val="accent1"/>
+            </a:effectRef>
+            <a:fontRef idx="minor">
+              <a:schemeClr val="tx1"/>
+            </a:fontRef>
+          </p:style>
+        </p:cxnSp>
+        <p:cxnSp>
+          <p:nvCxnSpPr>
+            <p:cNvPr id="120" name="Straight Connector 119">
+              <a:extLst>
+                <a:ext uri="{FF2B5EF4-FFF2-40B4-BE49-F238E27FC236}">
+                  <a16:creationId xmlns:a16="http://schemas.microsoft.com/office/drawing/2014/main" id="{1A8F86FF-7D8B-C509-088C-5C8AC35C0BB9}"/>
+                </a:ext>
+              </a:extLst>
+            </p:cNvPr>
+            <p:cNvCxnSpPr>
+              <a:cxnSpLocks/>
+              <a:stCxn id="112" idx="3"/>
+              <a:endCxn id="109" idx="2"/>
+            </p:cNvCxnSpPr>
+            <p:nvPr/>
+          </p:nvCxnSpPr>
+          <p:spPr>
+            <a:xfrm flipV="1">
+              <a:off x="7036991" y="4677203"/>
+              <a:ext cx="636350" cy="369594"/>
+            </a:xfrm>
+            <a:prstGeom prst="line">
+              <a:avLst/>
+            </a:prstGeom>
+            <a:ln w="25400">
+              <a:solidFill>
+                <a:srgbClr val="C00000"/>
+              </a:solidFill>
+            </a:ln>
+          </p:spPr>
+          <p:style>
+            <a:lnRef idx="1">
+              <a:schemeClr val="accent1"/>
+            </a:lnRef>
+            <a:fillRef idx="0">
+              <a:schemeClr val="accent1"/>
+            </a:fillRef>
+            <a:effectRef idx="0">
+              <a:schemeClr val="accent1"/>
+            </a:effectRef>
+            <a:fontRef idx="minor">
+              <a:schemeClr val="tx1"/>
+            </a:fontRef>
+          </p:style>
+        </p:cxnSp>
+        <p:cxnSp>
+          <p:nvCxnSpPr>
+            <p:cNvPr id="121" name="Straight Connector 120">
+              <a:extLst>
+                <a:ext uri="{FF2B5EF4-FFF2-40B4-BE49-F238E27FC236}">
+                  <a16:creationId xmlns:a16="http://schemas.microsoft.com/office/drawing/2014/main" id="{6B72729D-2558-F555-5A7F-511780DEDEAB}"/>
+                </a:ext>
+              </a:extLst>
+            </p:cNvPr>
+            <p:cNvCxnSpPr>
+              <a:cxnSpLocks/>
+              <a:stCxn id="110" idx="3"/>
+              <a:endCxn id="112" idx="2"/>
+            </p:cNvCxnSpPr>
+            <p:nvPr/>
+          </p:nvCxnSpPr>
+          <p:spPr>
+            <a:xfrm flipV="1">
+              <a:off x="5804862" y="5069656"/>
+              <a:ext cx="1209270" cy="317685"/>
+            </a:xfrm>
+            <a:prstGeom prst="line">
+              <a:avLst/>
+            </a:prstGeom>
+            <a:ln w="25400">
+              <a:solidFill>
+                <a:srgbClr val="C00000"/>
+              </a:solidFill>
+            </a:ln>
+          </p:spPr>
+          <p:style>
+            <a:lnRef idx="1">
+              <a:schemeClr val="accent1"/>
+            </a:lnRef>
+            <a:fillRef idx="0">
+              <a:schemeClr val="accent1"/>
+            </a:fillRef>
+            <a:effectRef idx="0">
+              <a:schemeClr val="accent1"/>
+            </a:effectRef>
+            <a:fontRef idx="minor">
+              <a:schemeClr val="tx1"/>
+            </a:fontRef>
+          </p:style>
+        </p:cxnSp>
+        <p:cxnSp>
+          <p:nvCxnSpPr>
+            <p:cNvPr id="122" name="Straight Connector 121">
+              <a:extLst>
+                <a:ext uri="{FF2B5EF4-FFF2-40B4-BE49-F238E27FC236}">
+                  <a16:creationId xmlns:a16="http://schemas.microsoft.com/office/drawing/2014/main" id="{D290A6EB-DFB2-470F-B55F-CB817BF6761E}"/>
+                </a:ext>
+              </a:extLst>
+            </p:cNvPr>
+            <p:cNvCxnSpPr>
+              <a:cxnSpLocks/>
+              <a:stCxn id="110" idx="3"/>
+              <a:endCxn id="102" idx="3"/>
+            </p:cNvCxnSpPr>
+            <p:nvPr/>
+          </p:nvCxnSpPr>
+          <p:spPr>
+            <a:xfrm flipH="1" flipV="1">
+              <a:off x="5379719" y="4625341"/>
+              <a:ext cx="425143" cy="762000"/>
+            </a:xfrm>
+            <a:prstGeom prst="line">
+              <a:avLst/>
+            </a:prstGeom>
+            <a:ln w="25400">
+              <a:solidFill>
+                <a:srgbClr val="C00000"/>
+              </a:solidFill>
+            </a:ln>
+          </p:spPr>
+          <p:style>
+            <a:lnRef idx="1">
+              <a:schemeClr val="accent1"/>
+            </a:lnRef>
+            <a:fillRef idx="0">
+              <a:schemeClr val="accent1"/>
+            </a:fillRef>
+            <a:effectRef idx="0">
+              <a:schemeClr val="accent1"/>
+            </a:effectRef>
+            <a:fontRef idx="minor">
+              <a:schemeClr val="tx1"/>
+            </a:fontRef>
+          </p:style>
+        </p:cxnSp>
+        <p:cxnSp>
+          <p:nvCxnSpPr>
+            <p:cNvPr id="123" name="Straight Connector 122">
+              <a:extLst>
+                <a:ext uri="{FF2B5EF4-FFF2-40B4-BE49-F238E27FC236}">
+                  <a16:creationId xmlns:a16="http://schemas.microsoft.com/office/drawing/2014/main" id="{D784BE8D-807B-3282-C568-3DDD3FEB76E7}"/>
+                </a:ext>
+              </a:extLst>
+            </p:cNvPr>
+            <p:cNvCxnSpPr>
+              <a:cxnSpLocks/>
+              <a:stCxn id="110" idx="3"/>
+              <a:endCxn id="111" idx="2"/>
+            </p:cNvCxnSpPr>
+            <p:nvPr/>
+          </p:nvCxnSpPr>
+          <p:spPr>
+            <a:xfrm flipV="1">
+              <a:off x="5804862" y="4789086"/>
+              <a:ext cx="313998" cy="598255"/>
+            </a:xfrm>
+            <a:prstGeom prst="line">
+              <a:avLst/>
+            </a:prstGeom>
+            <a:ln w="25400">
+              <a:solidFill>
+                <a:schemeClr val="tx1">
+                  <a:lumMod val="95000"/>
+                  <a:lumOff val="5000"/>
+                </a:schemeClr>
+              </a:solidFill>
+              <a:prstDash val="sysDash"/>
+            </a:ln>
+          </p:spPr>
+          <p:style>
+            <a:lnRef idx="1">
+              <a:schemeClr val="accent1"/>
+            </a:lnRef>
+            <a:fillRef idx="0">
+              <a:schemeClr val="accent1"/>
+            </a:fillRef>
+            <a:effectRef idx="0">
+              <a:schemeClr val="accent1"/>
+            </a:effectRef>
+            <a:fontRef idx="minor">
+              <a:schemeClr val="tx1"/>
+            </a:fontRef>
+          </p:style>
+        </p:cxnSp>
+        <p:cxnSp>
+          <p:nvCxnSpPr>
+            <p:cNvPr id="124" name="Straight Connector 123">
+              <a:extLst>
+                <a:ext uri="{FF2B5EF4-FFF2-40B4-BE49-F238E27FC236}">
+                  <a16:creationId xmlns:a16="http://schemas.microsoft.com/office/drawing/2014/main" id="{76EED179-0582-E392-D2CC-6FB6782B5A5E}"/>
+                </a:ext>
+              </a:extLst>
+            </p:cNvPr>
+            <p:cNvCxnSpPr>
+              <a:cxnSpLocks/>
+              <a:stCxn id="111" idx="3"/>
+              <a:endCxn id="102" idx="3"/>
+            </p:cNvCxnSpPr>
+            <p:nvPr/>
+          </p:nvCxnSpPr>
+          <p:spPr>
+            <a:xfrm flipH="1" flipV="1">
+              <a:off x="5379719" y="4625341"/>
+              <a:ext cx="762000" cy="140886"/>
+            </a:xfrm>
+            <a:prstGeom prst="line">
+              <a:avLst/>
+            </a:prstGeom>
+            <a:ln w="25400">
+              <a:solidFill>
+                <a:srgbClr val="C00000"/>
+              </a:solidFill>
+            </a:ln>
+          </p:spPr>
+          <p:style>
+            <a:lnRef idx="1">
+              <a:schemeClr val="accent1"/>
+            </a:lnRef>
+            <a:fillRef idx="0">
+              <a:schemeClr val="accent1"/>
+            </a:fillRef>
+            <a:effectRef idx="0">
+              <a:schemeClr val="accent1"/>
+            </a:effectRef>
+            <a:fontRef idx="minor">
+              <a:schemeClr val="tx1"/>
+            </a:fontRef>
+          </p:style>
+        </p:cxnSp>
+        <p:cxnSp>
+          <p:nvCxnSpPr>
+            <p:cNvPr id="125" name="Straight Connector 124">
+              <a:extLst>
+                <a:ext uri="{FF2B5EF4-FFF2-40B4-BE49-F238E27FC236}">
+                  <a16:creationId xmlns:a16="http://schemas.microsoft.com/office/drawing/2014/main" id="{6D258638-B5E4-26F3-ED41-4CB4EA2DBDD1}"/>
+                </a:ext>
+              </a:extLst>
+            </p:cNvPr>
+            <p:cNvCxnSpPr>
+              <a:cxnSpLocks/>
+              <a:stCxn id="113" idx="1"/>
+              <a:endCxn id="111" idx="3"/>
+            </p:cNvCxnSpPr>
+            <p:nvPr/>
+          </p:nvCxnSpPr>
+          <p:spPr>
+            <a:xfrm flipH="1">
+              <a:off x="6141719" y="4425744"/>
+              <a:ext cx="895272" cy="340483"/>
+            </a:xfrm>
+            <a:prstGeom prst="line">
+              <a:avLst/>
+            </a:prstGeom>
+            <a:ln w="25400">
+              <a:solidFill>
+                <a:srgbClr val="C00000"/>
+              </a:solidFill>
+            </a:ln>
+          </p:spPr>
+          <p:style>
+            <a:lnRef idx="1">
+              <a:schemeClr val="accent1"/>
+            </a:lnRef>
+            <a:fillRef idx="0">
+              <a:schemeClr val="accent1"/>
+            </a:fillRef>
+            <a:effectRef idx="0">
+              <a:schemeClr val="accent1"/>
+            </a:effectRef>
+            <a:fontRef idx="minor">
+              <a:schemeClr val="tx1"/>
+            </a:fontRef>
+          </p:style>
+        </p:cxnSp>
+      </p:grpSp>
+      <p:sp>
+        <p:nvSpPr>
+          <p:cNvPr id="2" name="TextBox 1">
+            <a:extLst>
+              <a:ext uri="{FF2B5EF4-FFF2-40B4-BE49-F238E27FC236}">
+                <a16:creationId xmlns:a16="http://schemas.microsoft.com/office/drawing/2014/main" id="{73AB2972-EF8C-4B4F-81C8-8472751791E7}"/>
+              </a:ext>
+            </a:extLst>
+          </p:cNvPr>
+          <p:cNvSpPr txBox="1"/>
+          <p:nvPr/>
+        </p:nvSpPr>
+        <p:spPr>
+          <a:xfrm>
+            <a:off x="583109" y="416898"/>
+            <a:ext cx="4724400" cy="338554"/>
+          </a:xfrm>
+          <a:prstGeom prst="rect">
+            <a:avLst/>
+          </a:prstGeom>
+          <a:noFill/>
+        </p:spPr>
+        <p:txBody>
+          <a:bodyPr wrap="square" rtlCol="0">
+            <a:spAutoFit/>
+          </a:bodyPr>
+          <a:lstStyle/>
+          <a:p>
+            <a:r>
+              <a:rPr lang="en-US" sz="1600" dirty="0"/>
+              <a:t>For Max-Cut problem image in Fig 3 of second paper</a:t>
+            </a:r>
+          </a:p>
+        </p:txBody>
+      </p:sp>
+      <p:sp>
+        <p:nvSpPr>
+          <p:cNvPr id="4" name="Oval 3">
+            <a:extLst>
+              <a:ext uri="{FF2B5EF4-FFF2-40B4-BE49-F238E27FC236}">
+                <a16:creationId xmlns:a16="http://schemas.microsoft.com/office/drawing/2014/main" id="{0B809591-B8A0-8C5E-E372-02ECCA536861}"/>
+              </a:ext>
+            </a:extLst>
+          </p:cNvPr>
+          <p:cNvSpPr>
+            <a:spLocks/>
+          </p:cNvSpPr>
+          <p:nvPr/>
+        </p:nvSpPr>
+        <p:spPr>
+          <a:xfrm>
+            <a:off x="5336792" y="2656399"/>
+            <a:ext cx="228600" cy="228600"/>
+          </a:xfrm>
+          <a:prstGeom prst="ellipse">
+            <a:avLst/>
+          </a:prstGeom>
+          <a:solidFill>
+            <a:schemeClr val="bg1"/>
+          </a:solidFill>
+          <a:ln w="50800">
+            <a:solidFill>
+              <a:srgbClr val="00B050"/>
+            </a:solidFill>
+          </a:ln>
+        </p:spPr>
+        <p:style>
+          <a:lnRef idx="2">
+            <a:schemeClr val="accent1">
+              <a:shade val="15000"/>
+            </a:schemeClr>
+          </a:lnRef>
+          <a:fillRef idx="1">
+            <a:schemeClr val="accent1"/>
+          </a:fillRef>
+          <a:effectRef idx="0">
+            <a:schemeClr val="accent1"/>
+          </a:effectRef>
+          <a:fontRef idx="minor">
+            <a:schemeClr val="lt1"/>
+          </a:fontRef>
+        </p:style>
+        <p:txBody>
+          <a:bodyPr rtlCol="0" anchor="ctr"/>
+          <a:lstStyle/>
+          <a:p>
+            <a:pPr algn="ctr"/>
+            <a:endParaRPr lang="en-US"/>
+          </a:p>
+        </p:txBody>
+      </p:sp>
+      <p:sp>
+        <p:nvSpPr>
+          <p:cNvPr id="6" name="Oval 5">
+            <a:extLst>
+              <a:ext uri="{FF2B5EF4-FFF2-40B4-BE49-F238E27FC236}">
+                <a16:creationId xmlns:a16="http://schemas.microsoft.com/office/drawing/2014/main" id="{188B820A-AFAE-0C5A-9E6E-5DD5B2756B95}"/>
+              </a:ext>
+            </a:extLst>
+          </p:cNvPr>
+          <p:cNvSpPr>
+            <a:spLocks/>
+          </p:cNvSpPr>
+          <p:nvPr/>
+        </p:nvSpPr>
+        <p:spPr>
+          <a:xfrm>
+            <a:off x="6358890" y="2032658"/>
+            <a:ext cx="228600" cy="228600"/>
+          </a:xfrm>
+          <a:prstGeom prst="ellipse">
+            <a:avLst/>
+          </a:prstGeom>
+          <a:ln>
+            <a:noFill/>
+          </a:ln>
+        </p:spPr>
+        <p:style>
+          <a:lnRef idx="2">
+            <a:schemeClr val="accent1">
+              <a:shade val="15000"/>
+            </a:schemeClr>
+          </a:lnRef>
+          <a:fillRef idx="1">
+            <a:schemeClr val="accent1"/>
+          </a:fillRef>
+          <a:effectRef idx="0">
+            <a:schemeClr val="accent1"/>
+          </a:effectRef>
+          <a:fontRef idx="minor">
+            <a:schemeClr val="lt1"/>
+          </a:fontRef>
+        </p:style>
+        <p:txBody>
+          <a:bodyPr rtlCol="0" anchor="ctr"/>
+          <a:lstStyle/>
+          <a:p>
+            <a:pPr algn="ctr"/>
+            <a:endParaRPr lang="en-US"/>
+          </a:p>
+        </p:txBody>
+      </p:sp>
+      <p:sp>
+        <p:nvSpPr>
+          <p:cNvPr id="9" name="Oval 8">
+            <a:extLst>
+              <a:ext uri="{FF2B5EF4-FFF2-40B4-BE49-F238E27FC236}">
+                <a16:creationId xmlns:a16="http://schemas.microsoft.com/office/drawing/2014/main" id="{6F321815-E3A7-9A61-9F79-6B234C760627}"/>
+              </a:ext>
+            </a:extLst>
+          </p:cNvPr>
+          <p:cNvSpPr>
+            <a:spLocks/>
+          </p:cNvSpPr>
+          <p:nvPr/>
+        </p:nvSpPr>
+        <p:spPr>
+          <a:xfrm>
+            <a:off x="7169592" y="1791063"/>
+            <a:ext cx="228600" cy="228600"/>
+          </a:xfrm>
+          <a:prstGeom prst="ellipse">
+            <a:avLst/>
+          </a:prstGeom>
+          <a:solidFill>
+            <a:schemeClr val="bg1"/>
+          </a:solidFill>
+          <a:ln w="50800">
+            <a:solidFill>
+              <a:srgbClr val="00B050"/>
+            </a:solidFill>
+          </a:ln>
+        </p:spPr>
+        <p:style>
+          <a:lnRef idx="2">
+            <a:schemeClr val="accent1">
+              <a:shade val="15000"/>
+            </a:schemeClr>
+          </a:lnRef>
+          <a:fillRef idx="1">
+            <a:schemeClr val="accent1"/>
+          </a:fillRef>
+          <a:effectRef idx="0">
+            <a:schemeClr val="accent1"/>
+          </a:effectRef>
+          <a:fontRef idx="minor">
+            <a:schemeClr val="lt1"/>
+          </a:fontRef>
+        </p:style>
+        <p:txBody>
+          <a:bodyPr rtlCol="0" anchor="ctr"/>
+          <a:lstStyle/>
+          <a:p>
+            <a:pPr algn="ctr"/>
+            <a:endParaRPr lang="en-US"/>
+          </a:p>
+        </p:txBody>
+      </p:sp>
+      <p:sp>
+        <p:nvSpPr>
+          <p:cNvPr id="11" name="Oval 10">
+            <a:extLst>
+              <a:ext uri="{FF2B5EF4-FFF2-40B4-BE49-F238E27FC236}">
+                <a16:creationId xmlns:a16="http://schemas.microsoft.com/office/drawing/2014/main" id="{3B9DFDED-5680-32C1-BE05-241451C07550}"/>
+              </a:ext>
+            </a:extLst>
+          </p:cNvPr>
+          <p:cNvSpPr>
+            <a:spLocks/>
+          </p:cNvSpPr>
+          <p:nvPr/>
+        </p:nvSpPr>
+        <p:spPr>
+          <a:xfrm>
+            <a:off x="7041337" y="2449981"/>
+            <a:ext cx="228600" cy="228600"/>
+          </a:xfrm>
+          <a:prstGeom prst="ellipse">
+            <a:avLst/>
+          </a:prstGeom>
+          <a:solidFill>
+            <a:schemeClr val="bg1"/>
+          </a:solidFill>
+          <a:ln w="50800">
+            <a:solidFill>
+              <a:srgbClr val="00B050"/>
+            </a:solidFill>
+          </a:ln>
+        </p:spPr>
+        <p:style>
+          <a:lnRef idx="2">
+            <a:schemeClr val="accent1">
+              <a:shade val="15000"/>
+            </a:schemeClr>
+          </a:lnRef>
+          <a:fillRef idx="1">
+            <a:schemeClr val="accent1"/>
+          </a:fillRef>
+          <a:effectRef idx="0">
+            <a:schemeClr val="accent1"/>
+          </a:effectRef>
+          <a:fontRef idx="minor">
+            <a:schemeClr val="lt1"/>
+          </a:fontRef>
+        </p:style>
+        <p:txBody>
+          <a:bodyPr rtlCol="0" anchor="ctr"/>
+          <a:lstStyle/>
+          <a:p>
+            <a:pPr algn="ctr"/>
+            <a:endParaRPr lang="en-US"/>
+          </a:p>
+        </p:txBody>
+      </p:sp>
+      <p:sp>
+        <p:nvSpPr>
+          <p:cNvPr id="12" name="Oval 11">
+            <a:extLst>
+              <a:ext uri="{FF2B5EF4-FFF2-40B4-BE49-F238E27FC236}">
+                <a16:creationId xmlns:a16="http://schemas.microsoft.com/office/drawing/2014/main" id="{2F2D8BAB-0BA1-446A-2376-342B04F1775D}"/>
+              </a:ext>
+            </a:extLst>
+          </p:cNvPr>
+          <p:cNvSpPr>
+            <a:spLocks/>
+          </p:cNvSpPr>
+          <p:nvPr/>
+        </p:nvSpPr>
+        <p:spPr>
+          <a:xfrm>
+            <a:off x="6960413" y="3101436"/>
+            <a:ext cx="228600" cy="228600"/>
+          </a:xfrm>
+          <a:prstGeom prst="ellipse">
+            <a:avLst/>
+          </a:prstGeom>
+          <a:solidFill>
+            <a:schemeClr val="bg1"/>
+          </a:solidFill>
+          <a:ln w="50800">
+            <a:solidFill>
+              <a:srgbClr val="00B050"/>
+            </a:solidFill>
+          </a:ln>
+        </p:spPr>
+        <p:style>
+          <a:lnRef idx="2">
+            <a:schemeClr val="accent1">
+              <a:shade val="15000"/>
+            </a:schemeClr>
+          </a:lnRef>
+          <a:fillRef idx="1">
+            <a:schemeClr val="accent1"/>
+          </a:fillRef>
+          <a:effectRef idx="0">
+            <a:schemeClr val="accent1"/>
+          </a:effectRef>
+          <a:fontRef idx="minor">
+            <a:schemeClr val="lt1"/>
+          </a:fontRef>
+        </p:style>
+        <p:txBody>
+          <a:bodyPr rtlCol="0" anchor="ctr"/>
+          <a:lstStyle/>
+          <a:p>
+            <a:pPr algn="ctr"/>
+            <a:endParaRPr lang="en-US"/>
+          </a:p>
+        </p:txBody>
+      </p:sp>
+      <p:sp>
+        <p:nvSpPr>
+          <p:cNvPr id="13" name="Oval 12">
+            <a:extLst>
+              <a:ext uri="{FF2B5EF4-FFF2-40B4-BE49-F238E27FC236}">
+                <a16:creationId xmlns:a16="http://schemas.microsoft.com/office/drawing/2014/main" id="{645F4210-4F7C-F52C-F9AC-32FA2EF0E7C1}"/>
+              </a:ext>
+            </a:extLst>
+          </p:cNvPr>
+          <p:cNvSpPr>
+            <a:spLocks/>
+          </p:cNvSpPr>
+          <p:nvPr/>
+        </p:nvSpPr>
+        <p:spPr>
+          <a:xfrm>
+            <a:off x="5762861" y="3429000"/>
+            <a:ext cx="228600" cy="228600"/>
+          </a:xfrm>
+          <a:prstGeom prst="ellipse">
+            <a:avLst/>
+          </a:prstGeom>
+          <a:ln>
+            <a:noFill/>
+          </a:ln>
+        </p:spPr>
+        <p:style>
+          <a:lnRef idx="2">
+            <a:schemeClr val="accent1">
+              <a:shade val="15000"/>
+            </a:schemeClr>
+          </a:lnRef>
+          <a:fillRef idx="1">
+            <a:schemeClr val="accent1"/>
+          </a:fillRef>
+          <a:effectRef idx="0">
+            <a:schemeClr val="accent1"/>
+          </a:effectRef>
+          <a:fontRef idx="minor">
+            <a:schemeClr val="lt1"/>
+          </a:fontRef>
+        </p:style>
+        <p:txBody>
+          <a:bodyPr rtlCol="0" anchor="ctr"/>
+          <a:lstStyle/>
+          <a:p>
+            <a:pPr algn="ctr"/>
+            <a:endParaRPr lang="en-US"/>
+          </a:p>
+        </p:txBody>
+      </p:sp>
+      <p:sp>
+        <p:nvSpPr>
+          <p:cNvPr id="14" name="Oval 13">
+            <a:extLst>
+              <a:ext uri="{FF2B5EF4-FFF2-40B4-BE49-F238E27FC236}">
+                <a16:creationId xmlns:a16="http://schemas.microsoft.com/office/drawing/2014/main" id="{49D4BF62-8789-E76E-A50C-6088AB6F3060}"/>
+              </a:ext>
+            </a:extLst>
+          </p:cNvPr>
+          <p:cNvSpPr>
+            <a:spLocks/>
+          </p:cNvSpPr>
+          <p:nvPr/>
+        </p:nvSpPr>
+        <p:spPr>
+          <a:xfrm>
+            <a:off x="6094241" y="2804160"/>
+            <a:ext cx="228600" cy="228600"/>
+          </a:xfrm>
+          <a:prstGeom prst="ellipse">
+            <a:avLst/>
+          </a:prstGeom>
+          <a:ln>
+            <a:noFill/>
+          </a:ln>
+        </p:spPr>
+        <p:style>
+          <a:lnRef idx="2">
+            <a:schemeClr val="accent1">
+              <a:shade val="15000"/>
+            </a:schemeClr>
+          </a:lnRef>
+          <a:fillRef idx="1">
+            <a:schemeClr val="accent1"/>
+          </a:fillRef>
+          <a:effectRef idx="0">
+            <a:schemeClr val="accent1"/>
+          </a:effectRef>
+          <a:fontRef idx="minor">
+            <a:schemeClr val="lt1"/>
+          </a:fontRef>
+        </p:style>
+        <p:txBody>
+          <a:bodyPr rtlCol="0" anchor="ctr"/>
+          <a:lstStyle/>
+          <a:p>
+            <a:pPr algn="ctr"/>
+            <a:endParaRPr lang="en-US"/>
+          </a:p>
+        </p:txBody>
+      </p:sp>
+      <p:sp>
+        <p:nvSpPr>
+          <p:cNvPr id="15" name="Oval 14">
+            <a:extLst>
+              <a:ext uri="{FF2B5EF4-FFF2-40B4-BE49-F238E27FC236}">
+                <a16:creationId xmlns:a16="http://schemas.microsoft.com/office/drawing/2014/main" id="{CFC727E6-2DA9-AF70-EBA5-5D9BAF5C58D1}"/>
+              </a:ext>
+            </a:extLst>
+          </p:cNvPr>
+          <p:cNvSpPr>
+            <a:spLocks/>
+          </p:cNvSpPr>
+          <p:nvPr/>
+        </p:nvSpPr>
+        <p:spPr>
+          <a:xfrm>
+            <a:off x="7620000" y="2696642"/>
+            <a:ext cx="228600" cy="228600"/>
+          </a:xfrm>
+          <a:prstGeom prst="ellipse">
+            <a:avLst/>
+          </a:prstGeom>
+          <a:ln>
+            <a:noFill/>
+          </a:ln>
+        </p:spPr>
+        <p:style>
+          <a:lnRef idx="2">
+            <a:schemeClr val="accent1">
+              <a:shade val="15000"/>
+            </a:schemeClr>
+          </a:lnRef>
+          <a:fillRef idx="1">
+            <a:schemeClr val="accent1"/>
+          </a:fillRef>
+          <a:effectRef idx="0">
+            <a:schemeClr val="accent1"/>
+          </a:effectRef>
+          <a:fontRef idx="minor">
+            <a:schemeClr val="lt1"/>
+          </a:fontRef>
+        </p:style>
+        <p:txBody>
+          <a:bodyPr rtlCol="0" anchor="ctr"/>
+          <a:lstStyle/>
+          <a:p>
+            <a:pPr algn="ctr"/>
+            <a:endParaRPr lang="en-US"/>
+          </a:p>
+        </p:txBody>
+      </p:sp>
+      <p:grpSp>
+        <p:nvGrpSpPr>
+          <p:cNvPr id="99" name="Group 98">
+            <a:extLst>
+              <a:ext uri="{FF2B5EF4-FFF2-40B4-BE49-F238E27FC236}">
+                <a16:creationId xmlns:a16="http://schemas.microsoft.com/office/drawing/2014/main" id="{99A4C455-9BE4-71C6-1B91-C82EA43388D2}"/>
+              </a:ext>
+            </a:extLst>
+          </p:cNvPr>
+          <p:cNvGrpSpPr/>
+          <p:nvPr/>
+        </p:nvGrpSpPr>
+        <p:grpSpPr>
+          <a:xfrm>
+            <a:off x="1490388" y="1981745"/>
+            <a:ext cx="2362200" cy="1676400"/>
+            <a:chOff x="5334000" y="3733800"/>
+            <a:chExt cx="2362200" cy="1676400"/>
+          </a:xfrm>
+        </p:grpSpPr>
+        <p:sp>
+          <p:nvSpPr>
+            <p:cNvPr id="48" name="Rectangle 47">
+              <a:extLst>
+                <a:ext uri="{FF2B5EF4-FFF2-40B4-BE49-F238E27FC236}">
+                  <a16:creationId xmlns:a16="http://schemas.microsoft.com/office/drawing/2014/main" id="{95E99F3A-AFDD-F514-31E5-AE7902853CE4}"/>
+                </a:ext>
+              </a:extLst>
+            </p:cNvPr>
+            <p:cNvSpPr/>
+            <p:nvPr/>
+          </p:nvSpPr>
+          <p:spPr>
+            <a:xfrm>
+              <a:off x="5334000" y="4602481"/>
+              <a:ext cx="45719" cy="45719"/>
+            </a:xfrm>
+            <a:prstGeom prst="rect">
+              <a:avLst/>
+            </a:prstGeom>
+          </p:spPr>
+          <p:style>
+            <a:lnRef idx="2">
+              <a:schemeClr val="accent1">
+                <a:shade val="15000"/>
+              </a:schemeClr>
+            </a:lnRef>
+            <a:fillRef idx="1">
+              <a:schemeClr val="accent1"/>
+            </a:fillRef>
+            <a:effectRef idx="0">
+              <a:schemeClr val="accent1"/>
+            </a:effectRef>
+            <a:fontRef idx="minor">
+              <a:schemeClr val="lt1"/>
+            </a:fontRef>
+          </p:style>
+          <p:txBody>
+            <a:bodyPr rtlCol="0" anchor="ctr"/>
+            <a:lstStyle/>
+            <a:p>
+              <a:pPr algn="ctr"/>
+              <a:endParaRPr lang="en-US"/>
+            </a:p>
+          </p:txBody>
+        </p:sp>
+        <p:sp>
+          <p:nvSpPr>
+            <p:cNvPr id="49" name="Rectangle 48">
+              <a:extLst>
+                <a:ext uri="{FF2B5EF4-FFF2-40B4-BE49-F238E27FC236}">
+                  <a16:creationId xmlns:a16="http://schemas.microsoft.com/office/drawing/2014/main" id="{8FE6A910-0ABD-4103-A0F1-B9C967032684}"/>
+                </a:ext>
+              </a:extLst>
+            </p:cNvPr>
+            <p:cNvSpPr/>
+            <p:nvPr/>
+          </p:nvSpPr>
+          <p:spPr>
+            <a:xfrm>
+              <a:off x="6355081" y="3967732"/>
+              <a:ext cx="45719" cy="45719"/>
+            </a:xfrm>
+            <a:prstGeom prst="rect">
+              <a:avLst/>
+            </a:prstGeom>
+          </p:spPr>
+          <p:style>
+            <a:lnRef idx="2">
+              <a:schemeClr val="accent1">
+                <a:shade val="15000"/>
+              </a:schemeClr>
+            </a:lnRef>
+            <a:fillRef idx="1">
+              <a:schemeClr val="accent1"/>
+            </a:fillRef>
+            <a:effectRef idx="0">
+              <a:schemeClr val="accent1"/>
+            </a:effectRef>
+            <a:fontRef idx="minor">
+              <a:schemeClr val="lt1"/>
+            </a:fontRef>
+          </p:style>
+          <p:txBody>
+            <a:bodyPr rtlCol="0" anchor="ctr"/>
+            <a:lstStyle/>
+            <a:p>
+              <a:pPr algn="ctr"/>
+              <a:endParaRPr lang="en-US"/>
+            </a:p>
+          </p:txBody>
+        </p:sp>
+        <p:sp>
+          <p:nvSpPr>
+            <p:cNvPr id="50" name="Rectangle 49">
+              <a:extLst>
+                <a:ext uri="{FF2B5EF4-FFF2-40B4-BE49-F238E27FC236}">
+                  <a16:creationId xmlns:a16="http://schemas.microsoft.com/office/drawing/2014/main" id="{9E6D8B06-0899-A957-0088-6225AFDC5114}"/>
+                </a:ext>
+              </a:extLst>
+            </p:cNvPr>
+            <p:cNvSpPr/>
+            <p:nvPr/>
+          </p:nvSpPr>
+          <p:spPr>
+            <a:xfrm>
+              <a:off x="7193281" y="3733800"/>
+              <a:ext cx="45719" cy="45719"/>
+            </a:xfrm>
+            <a:prstGeom prst="rect">
+              <a:avLst/>
+            </a:prstGeom>
+          </p:spPr>
+          <p:style>
+            <a:lnRef idx="2">
+              <a:schemeClr val="accent1">
+                <a:shade val="15000"/>
+              </a:schemeClr>
+            </a:lnRef>
+            <a:fillRef idx="1">
+              <a:schemeClr val="accent1"/>
+            </a:fillRef>
+            <a:effectRef idx="0">
+              <a:schemeClr val="accent1"/>
+            </a:effectRef>
+            <a:fontRef idx="minor">
+              <a:schemeClr val="lt1"/>
+            </a:fontRef>
+          </p:style>
+          <p:txBody>
+            <a:bodyPr rtlCol="0" anchor="ctr"/>
+            <a:lstStyle/>
+            <a:p>
+              <a:pPr algn="ctr"/>
+              <a:endParaRPr lang="en-US"/>
+            </a:p>
+          </p:txBody>
+        </p:sp>
+        <p:sp>
+          <p:nvSpPr>
+            <p:cNvPr id="51" name="Rectangle 50">
+              <a:extLst>
+                <a:ext uri="{FF2B5EF4-FFF2-40B4-BE49-F238E27FC236}">
+                  <a16:creationId xmlns:a16="http://schemas.microsoft.com/office/drawing/2014/main" id="{A768A11A-5DDF-2BA9-2C39-C521670D1B92}"/>
+                </a:ext>
+              </a:extLst>
+            </p:cNvPr>
+            <p:cNvSpPr/>
+            <p:nvPr/>
+          </p:nvSpPr>
+          <p:spPr>
+            <a:xfrm>
+              <a:off x="7650481" y="4631484"/>
+              <a:ext cx="45719" cy="45719"/>
+            </a:xfrm>
+            <a:prstGeom prst="rect">
+              <a:avLst/>
+            </a:prstGeom>
+          </p:spPr>
+          <p:style>
+            <a:lnRef idx="2">
+              <a:schemeClr val="accent1">
+                <a:shade val="15000"/>
+              </a:schemeClr>
+            </a:lnRef>
+            <a:fillRef idx="1">
+              <a:schemeClr val="accent1"/>
+            </a:fillRef>
+            <a:effectRef idx="0">
+              <a:schemeClr val="accent1"/>
+            </a:effectRef>
+            <a:fontRef idx="minor">
+              <a:schemeClr val="lt1"/>
+            </a:fontRef>
+          </p:style>
+          <p:txBody>
+            <a:bodyPr rtlCol="0" anchor="ctr"/>
+            <a:lstStyle/>
+            <a:p>
+              <a:pPr algn="ctr"/>
+              <a:endParaRPr lang="en-US"/>
+            </a:p>
+          </p:txBody>
+        </p:sp>
+        <p:sp>
+          <p:nvSpPr>
+            <p:cNvPr id="52" name="Rectangle 51">
+              <a:extLst>
+                <a:ext uri="{FF2B5EF4-FFF2-40B4-BE49-F238E27FC236}">
+                  <a16:creationId xmlns:a16="http://schemas.microsoft.com/office/drawing/2014/main" id="{8ED838A8-C21C-A4AB-5532-09D3DC60473A}"/>
+                </a:ext>
+              </a:extLst>
+            </p:cNvPr>
+            <p:cNvSpPr/>
+            <p:nvPr/>
+          </p:nvSpPr>
+          <p:spPr>
+            <a:xfrm>
+              <a:off x="5759143" y="5364481"/>
+              <a:ext cx="45719" cy="45719"/>
+            </a:xfrm>
+            <a:prstGeom prst="rect">
+              <a:avLst/>
+            </a:prstGeom>
+          </p:spPr>
+          <p:style>
+            <a:lnRef idx="2">
+              <a:schemeClr val="accent1">
+                <a:shade val="15000"/>
+              </a:schemeClr>
+            </a:lnRef>
+            <a:fillRef idx="1">
+              <a:schemeClr val="accent1"/>
+            </a:fillRef>
+            <a:effectRef idx="0">
+              <a:schemeClr val="accent1"/>
+            </a:effectRef>
+            <a:fontRef idx="minor">
+              <a:schemeClr val="lt1"/>
+            </a:fontRef>
+          </p:style>
+          <p:txBody>
+            <a:bodyPr rtlCol="0" anchor="ctr"/>
+            <a:lstStyle/>
+            <a:p>
+              <a:pPr algn="ctr"/>
+              <a:endParaRPr lang="en-US"/>
+            </a:p>
+          </p:txBody>
+        </p:sp>
+        <p:sp>
+          <p:nvSpPr>
+            <p:cNvPr id="53" name="Rectangle 52">
+              <a:extLst>
+                <a:ext uri="{FF2B5EF4-FFF2-40B4-BE49-F238E27FC236}">
+                  <a16:creationId xmlns:a16="http://schemas.microsoft.com/office/drawing/2014/main" id="{A0FF9628-202F-B0B9-EEF0-7D7F5306E45D}"/>
+                </a:ext>
+              </a:extLst>
+            </p:cNvPr>
+            <p:cNvSpPr/>
+            <p:nvPr/>
+          </p:nvSpPr>
+          <p:spPr>
+            <a:xfrm>
+              <a:off x="6096000" y="4743367"/>
+              <a:ext cx="45719" cy="45719"/>
+            </a:xfrm>
+            <a:prstGeom prst="rect">
+              <a:avLst/>
+            </a:prstGeom>
+          </p:spPr>
+          <p:style>
+            <a:lnRef idx="2">
+              <a:schemeClr val="accent1">
+                <a:shade val="15000"/>
+              </a:schemeClr>
+            </a:lnRef>
+            <a:fillRef idx="1">
+              <a:schemeClr val="accent1"/>
+            </a:fillRef>
+            <a:effectRef idx="0">
+              <a:schemeClr val="accent1"/>
+            </a:effectRef>
+            <a:fontRef idx="minor">
+              <a:schemeClr val="lt1"/>
+            </a:fontRef>
+          </p:style>
+          <p:txBody>
+            <a:bodyPr rtlCol="0" anchor="ctr"/>
+            <a:lstStyle/>
+            <a:p>
+              <a:pPr algn="ctr"/>
+              <a:endParaRPr lang="en-US"/>
+            </a:p>
+          </p:txBody>
+        </p:sp>
+        <p:sp>
+          <p:nvSpPr>
+            <p:cNvPr id="55" name="Rectangle 54">
+              <a:extLst>
+                <a:ext uri="{FF2B5EF4-FFF2-40B4-BE49-F238E27FC236}">
+                  <a16:creationId xmlns:a16="http://schemas.microsoft.com/office/drawing/2014/main" id="{F7524A1A-C5F6-B202-136E-DCDE66B27263}"/>
+                </a:ext>
+              </a:extLst>
+            </p:cNvPr>
+            <p:cNvSpPr/>
+            <p:nvPr/>
+          </p:nvSpPr>
+          <p:spPr>
+            <a:xfrm>
+              <a:off x="6991272" y="5023937"/>
+              <a:ext cx="45719" cy="45719"/>
+            </a:xfrm>
+            <a:prstGeom prst="rect">
+              <a:avLst/>
+            </a:prstGeom>
+          </p:spPr>
+          <p:style>
+            <a:lnRef idx="2">
+              <a:schemeClr val="accent1">
+                <a:shade val="15000"/>
+              </a:schemeClr>
+            </a:lnRef>
+            <a:fillRef idx="1">
+              <a:schemeClr val="accent1"/>
+            </a:fillRef>
+            <a:effectRef idx="0">
+              <a:schemeClr val="accent1"/>
+            </a:effectRef>
+            <a:fontRef idx="minor">
+              <a:schemeClr val="lt1"/>
+            </a:fontRef>
+          </p:style>
+          <p:txBody>
+            <a:bodyPr rtlCol="0" anchor="ctr"/>
+            <a:lstStyle/>
+            <a:p>
+              <a:pPr algn="ctr"/>
+              <a:endParaRPr lang="en-US"/>
+            </a:p>
+          </p:txBody>
+        </p:sp>
+        <p:sp>
+          <p:nvSpPr>
+            <p:cNvPr id="56" name="Rectangle 55">
+              <a:extLst>
+                <a:ext uri="{FF2B5EF4-FFF2-40B4-BE49-F238E27FC236}">
+                  <a16:creationId xmlns:a16="http://schemas.microsoft.com/office/drawing/2014/main" id="{9C03F4E1-A452-41FA-2EC6-11BEBC52F9B4}"/>
+                </a:ext>
+              </a:extLst>
+            </p:cNvPr>
+            <p:cNvSpPr/>
+            <p:nvPr/>
+          </p:nvSpPr>
+          <p:spPr>
+            <a:xfrm>
+              <a:off x="7036991" y="4402884"/>
+              <a:ext cx="45719" cy="45719"/>
+            </a:xfrm>
+            <a:prstGeom prst="rect">
+              <a:avLst/>
+            </a:prstGeom>
+          </p:spPr>
+          <p:style>
+            <a:lnRef idx="2">
+              <a:schemeClr val="accent1">
+                <a:shade val="15000"/>
+              </a:schemeClr>
+            </a:lnRef>
+            <a:fillRef idx="1">
+              <a:schemeClr val="accent1"/>
+            </a:fillRef>
+            <a:effectRef idx="0">
+              <a:schemeClr val="accent1"/>
+            </a:effectRef>
+            <a:fontRef idx="minor">
+              <a:schemeClr val="lt1"/>
+            </a:fontRef>
+          </p:style>
+          <p:txBody>
+            <a:bodyPr rtlCol="0" anchor="ctr"/>
+            <a:lstStyle/>
+            <a:p>
+              <a:pPr algn="ctr"/>
+              <a:endParaRPr lang="en-US"/>
+            </a:p>
+          </p:txBody>
+        </p:sp>
+        <p:cxnSp>
+          <p:nvCxnSpPr>
+            <p:cNvPr id="58" name="Straight Connector 57">
+              <a:extLst>
+                <a:ext uri="{FF2B5EF4-FFF2-40B4-BE49-F238E27FC236}">
+                  <a16:creationId xmlns:a16="http://schemas.microsoft.com/office/drawing/2014/main" id="{3BE140AF-E915-523B-A158-DD9C8DA33065}"/>
+                </a:ext>
+              </a:extLst>
+            </p:cNvPr>
+            <p:cNvCxnSpPr>
+              <a:cxnSpLocks/>
+              <a:stCxn id="48" idx="3"/>
+              <a:endCxn id="49" idx="1"/>
+            </p:cNvCxnSpPr>
+            <p:nvPr/>
+          </p:nvCxnSpPr>
+          <p:spPr>
+            <a:xfrm flipV="1">
+              <a:off x="5379719" y="3990592"/>
+              <a:ext cx="975362" cy="634749"/>
+            </a:xfrm>
+            <a:prstGeom prst="line">
+              <a:avLst/>
+            </a:prstGeom>
+          </p:spPr>
+          <p:style>
+            <a:lnRef idx="1">
+              <a:schemeClr val="accent1"/>
+            </a:lnRef>
+            <a:fillRef idx="0">
+              <a:schemeClr val="accent1"/>
+            </a:fillRef>
+            <a:effectRef idx="0">
+              <a:schemeClr val="accent1"/>
+            </a:effectRef>
+            <a:fontRef idx="minor">
+              <a:schemeClr val="tx1"/>
+            </a:fontRef>
+          </p:style>
+        </p:cxnSp>
+        <p:cxnSp>
+          <p:nvCxnSpPr>
+            <p:cNvPr id="59" name="Straight Connector 58">
+              <a:extLst>
+                <a:ext uri="{FF2B5EF4-FFF2-40B4-BE49-F238E27FC236}">
+                  <a16:creationId xmlns:a16="http://schemas.microsoft.com/office/drawing/2014/main" id="{92E4B01C-DE07-0AD1-B6B2-8840003159A0}"/>
+                </a:ext>
+              </a:extLst>
+            </p:cNvPr>
+            <p:cNvCxnSpPr>
+              <a:cxnSpLocks/>
+              <a:stCxn id="49" idx="3"/>
+              <a:endCxn id="50" idx="1"/>
+            </p:cNvCxnSpPr>
+            <p:nvPr/>
+          </p:nvCxnSpPr>
+          <p:spPr>
+            <a:xfrm flipV="1">
+              <a:off x="6400800" y="3756660"/>
+              <a:ext cx="792481" cy="233932"/>
+            </a:xfrm>
+            <a:prstGeom prst="line">
+              <a:avLst/>
+            </a:prstGeom>
+          </p:spPr>
+          <p:style>
+            <a:lnRef idx="1">
+              <a:schemeClr val="accent1"/>
+            </a:lnRef>
+            <a:fillRef idx="0">
+              <a:schemeClr val="accent1"/>
+            </a:fillRef>
+            <a:effectRef idx="0">
+              <a:schemeClr val="accent1"/>
+            </a:effectRef>
+            <a:fontRef idx="minor">
+              <a:schemeClr val="tx1"/>
+            </a:fontRef>
+          </p:style>
+        </p:cxnSp>
+        <p:cxnSp>
+          <p:nvCxnSpPr>
+            <p:cNvPr id="60" name="Straight Connector 59">
+              <a:extLst>
+                <a:ext uri="{FF2B5EF4-FFF2-40B4-BE49-F238E27FC236}">
+                  <a16:creationId xmlns:a16="http://schemas.microsoft.com/office/drawing/2014/main" id="{D260D8B9-02DF-46DB-258F-786F8294A371}"/>
+                </a:ext>
+              </a:extLst>
+            </p:cNvPr>
+            <p:cNvCxnSpPr>
+              <a:cxnSpLocks/>
+              <a:stCxn id="51" idx="2"/>
+              <a:endCxn id="50" idx="3"/>
+            </p:cNvCxnSpPr>
+            <p:nvPr/>
+          </p:nvCxnSpPr>
+          <p:spPr>
+            <a:xfrm flipH="1" flipV="1">
+              <a:off x="7239000" y="3756660"/>
+              <a:ext cx="434341" cy="920543"/>
+            </a:xfrm>
+            <a:prstGeom prst="line">
+              <a:avLst/>
+            </a:prstGeom>
+          </p:spPr>
+          <p:style>
+            <a:lnRef idx="1">
+              <a:schemeClr val="accent1"/>
+            </a:lnRef>
+            <a:fillRef idx="0">
+              <a:schemeClr val="accent1"/>
+            </a:fillRef>
+            <a:effectRef idx="0">
+              <a:schemeClr val="accent1"/>
+            </a:effectRef>
+            <a:fontRef idx="minor">
+              <a:schemeClr val="tx1"/>
+            </a:fontRef>
+          </p:style>
+        </p:cxnSp>
+        <p:cxnSp>
+          <p:nvCxnSpPr>
+            <p:cNvPr id="61" name="Straight Connector 60">
+              <a:extLst>
+                <a:ext uri="{FF2B5EF4-FFF2-40B4-BE49-F238E27FC236}">
+                  <a16:creationId xmlns:a16="http://schemas.microsoft.com/office/drawing/2014/main" id="{8FC6B5BF-CFC1-54B6-6293-D7263DE98790}"/>
+                </a:ext>
+              </a:extLst>
+            </p:cNvPr>
+            <p:cNvCxnSpPr>
+              <a:cxnSpLocks/>
+              <a:stCxn id="56" idx="2"/>
+              <a:endCxn id="50" idx="2"/>
+            </p:cNvCxnSpPr>
+            <p:nvPr/>
+          </p:nvCxnSpPr>
+          <p:spPr>
+            <a:xfrm flipV="1">
+              <a:off x="7059851" y="3779519"/>
+              <a:ext cx="156290" cy="669084"/>
+            </a:xfrm>
+            <a:prstGeom prst="line">
+              <a:avLst/>
+            </a:prstGeom>
+          </p:spPr>
+          <p:style>
+            <a:lnRef idx="1">
+              <a:schemeClr val="accent1"/>
+            </a:lnRef>
+            <a:fillRef idx="0">
+              <a:schemeClr val="accent1"/>
+            </a:fillRef>
+            <a:effectRef idx="0">
+              <a:schemeClr val="accent1"/>
+            </a:effectRef>
+            <a:fontRef idx="minor">
+              <a:schemeClr val="tx1"/>
+            </a:fontRef>
+          </p:style>
+        </p:cxnSp>
+        <p:cxnSp>
+          <p:nvCxnSpPr>
+            <p:cNvPr id="62" name="Straight Connector 61">
+              <a:extLst>
+                <a:ext uri="{FF2B5EF4-FFF2-40B4-BE49-F238E27FC236}">
+                  <a16:creationId xmlns:a16="http://schemas.microsoft.com/office/drawing/2014/main" id="{BA94F1B0-39FD-A70B-C141-73E3F99ECC55}"/>
+                </a:ext>
+              </a:extLst>
+            </p:cNvPr>
+            <p:cNvCxnSpPr>
+              <a:cxnSpLocks/>
+              <a:stCxn id="51" idx="2"/>
+            </p:cNvCxnSpPr>
+            <p:nvPr/>
+          </p:nvCxnSpPr>
+          <p:spPr>
+            <a:xfrm flipH="1" flipV="1">
+              <a:off x="7107603" y="4414339"/>
+              <a:ext cx="565738" cy="262864"/>
+            </a:xfrm>
+            <a:prstGeom prst="line">
+              <a:avLst/>
+            </a:prstGeom>
+          </p:spPr>
+          <p:style>
+            <a:lnRef idx="1">
+              <a:schemeClr val="accent1"/>
+            </a:lnRef>
+            <a:fillRef idx="0">
+              <a:schemeClr val="accent1"/>
+            </a:fillRef>
+            <a:effectRef idx="0">
+              <a:schemeClr val="accent1"/>
+            </a:effectRef>
+            <a:fontRef idx="minor">
+              <a:schemeClr val="tx1"/>
+            </a:fontRef>
+          </p:style>
+        </p:cxnSp>
+        <p:cxnSp>
+          <p:nvCxnSpPr>
+            <p:cNvPr id="63" name="Straight Connector 62">
+              <a:extLst>
+                <a:ext uri="{FF2B5EF4-FFF2-40B4-BE49-F238E27FC236}">
+                  <a16:creationId xmlns:a16="http://schemas.microsoft.com/office/drawing/2014/main" id="{803A3D47-7D4D-E08E-A801-3C7C72F4B44D}"/>
+                </a:ext>
+              </a:extLst>
+            </p:cNvPr>
+            <p:cNvCxnSpPr>
+              <a:cxnSpLocks/>
+              <a:stCxn id="55" idx="2"/>
+              <a:endCxn id="49" idx="2"/>
+            </p:cNvCxnSpPr>
+            <p:nvPr/>
+          </p:nvCxnSpPr>
+          <p:spPr>
+            <a:xfrm flipH="1" flipV="1">
+              <a:off x="6377941" y="4013451"/>
+              <a:ext cx="636191" cy="1056205"/>
+            </a:xfrm>
+            <a:prstGeom prst="line">
+              <a:avLst/>
+            </a:prstGeom>
+          </p:spPr>
+          <p:style>
+            <a:lnRef idx="1">
+              <a:schemeClr val="accent1"/>
+            </a:lnRef>
+            <a:fillRef idx="0">
+              <a:schemeClr val="accent1"/>
+            </a:fillRef>
+            <a:effectRef idx="0">
+              <a:schemeClr val="accent1"/>
+            </a:effectRef>
+            <a:fontRef idx="minor">
+              <a:schemeClr val="tx1"/>
+            </a:fontRef>
+          </p:style>
+        </p:cxnSp>
+        <p:cxnSp>
+          <p:nvCxnSpPr>
+            <p:cNvPr id="64" name="Straight Connector 63">
+              <a:extLst>
+                <a:ext uri="{FF2B5EF4-FFF2-40B4-BE49-F238E27FC236}">
+                  <a16:creationId xmlns:a16="http://schemas.microsoft.com/office/drawing/2014/main" id="{F8741460-1044-00B6-8220-4DBE12AC808C}"/>
+                </a:ext>
+              </a:extLst>
+            </p:cNvPr>
+            <p:cNvCxnSpPr>
+              <a:cxnSpLocks/>
+              <a:stCxn id="55" idx="3"/>
+              <a:endCxn id="51" idx="2"/>
+            </p:cNvCxnSpPr>
+            <p:nvPr/>
+          </p:nvCxnSpPr>
+          <p:spPr>
+            <a:xfrm flipV="1">
+              <a:off x="7036991" y="4677203"/>
+              <a:ext cx="636350" cy="369594"/>
+            </a:xfrm>
+            <a:prstGeom prst="line">
+              <a:avLst/>
+            </a:prstGeom>
+          </p:spPr>
+          <p:style>
+            <a:lnRef idx="1">
+              <a:schemeClr val="accent1"/>
+            </a:lnRef>
+            <a:fillRef idx="0">
+              <a:schemeClr val="accent1"/>
+            </a:fillRef>
+            <a:effectRef idx="0">
+              <a:schemeClr val="accent1"/>
+            </a:effectRef>
+            <a:fontRef idx="minor">
+              <a:schemeClr val="tx1"/>
+            </a:fontRef>
+          </p:style>
+        </p:cxnSp>
+        <p:cxnSp>
+          <p:nvCxnSpPr>
+            <p:cNvPr id="65" name="Straight Connector 64">
+              <a:extLst>
+                <a:ext uri="{FF2B5EF4-FFF2-40B4-BE49-F238E27FC236}">
+                  <a16:creationId xmlns:a16="http://schemas.microsoft.com/office/drawing/2014/main" id="{19A9ABA0-4829-6563-2D40-ECC5BD7DE9ED}"/>
+                </a:ext>
+              </a:extLst>
+            </p:cNvPr>
+            <p:cNvCxnSpPr>
+              <a:cxnSpLocks/>
+              <a:stCxn id="52" idx="3"/>
+              <a:endCxn id="55" idx="2"/>
+            </p:cNvCxnSpPr>
+            <p:nvPr/>
+          </p:nvCxnSpPr>
+          <p:spPr>
+            <a:xfrm flipV="1">
+              <a:off x="5804862" y="5069656"/>
+              <a:ext cx="1209270" cy="317685"/>
+            </a:xfrm>
+            <a:prstGeom prst="line">
+              <a:avLst/>
+            </a:prstGeom>
+          </p:spPr>
+          <p:style>
+            <a:lnRef idx="1">
+              <a:schemeClr val="accent1"/>
+            </a:lnRef>
+            <a:fillRef idx="0">
+              <a:schemeClr val="accent1"/>
+            </a:fillRef>
+            <a:effectRef idx="0">
+              <a:schemeClr val="accent1"/>
+            </a:effectRef>
+            <a:fontRef idx="minor">
+              <a:schemeClr val="tx1"/>
+            </a:fontRef>
+          </p:style>
+        </p:cxnSp>
+        <p:cxnSp>
+          <p:nvCxnSpPr>
+            <p:cNvPr id="66" name="Straight Connector 65">
+              <a:extLst>
+                <a:ext uri="{FF2B5EF4-FFF2-40B4-BE49-F238E27FC236}">
+                  <a16:creationId xmlns:a16="http://schemas.microsoft.com/office/drawing/2014/main" id="{C55FFC34-E9CA-D88B-D909-BE7E2D63A372}"/>
+                </a:ext>
+              </a:extLst>
+            </p:cNvPr>
+            <p:cNvCxnSpPr>
+              <a:cxnSpLocks/>
+              <a:stCxn id="52" idx="3"/>
+              <a:endCxn id="48" idx="3"/>
+            </p:cNvCxnSpPr>
+            <p:nvPr/>
+          </p:nvCxnSpPr>
+          <p:spPr>
+            <a:xfrm flipH="1" flipV="1">
+              <a:off x="5379719" y="4625341"/>
+              <a:ext cx="425143" cy="762000"/>
+            </a:xfrm>
+            <a:prstGeom prst="line">
+              <a:avLst/>
+            </a:prstGeom>
+          </p:spPr>
+          <p:style>
+            <a:lnRef idx="1">
+              <a:schemeClr val="accent1"/>
+            </a:lnRef>
+            <a:fillRef idx="0">
+              <a:schemeClr val="accent1"/>
+            </a:fillRef>
+            <a:effectRef idx="0">
+              <a:schemeClr val="accent1"/>
+            </a:effectRef>
+            <a:fontRef idx="minor">
+              <a:schemeClr val="tx1"/>
+            </a:fontRef>
+          </p:style>
+        </p:cxnSp>
+        <p:cxnSp>
+          <p:nvCxnSpPr>
+            <p:cNvPr id="68" name="Straight Connector 67">
+              <a:extLst>
+                <a:ext uri="{FF2B5EF4-FFF2-40B4-BE49-F238E27FC236}">
+                  <a16:creationId xmlns:a16="http://schemas.microsoft.com/office/drawing/2014/main" id="{032649D2-4231-D9E6-7215-1A2134635F88}"/>
+                </a:ext>
+              </a:extLst>
+            </p:cNvPr>
+            <p:cNvCxnSpPr>
+              <a:cxnSpLocks/>
+              <a:stCxn id="52" idx="3"/>
+              <a:endCxn id="53" idx="2"/>
+            </p:cNvCxnSpPr>
+            <p:nvPr/>
+          </p:nvCxnSpPr>
+          <p:spPr>
+            <a:xfrm flipV="1">
+              <a:off x="5804862" y="4789086"/>
+              <a:ext cx="313998" cy="598255"/>
+            </a:xfrm>
+            <a:prstGeom prst="line">
+              <a:avLst/>
+            </a:prstGeom>
+          </p:spPr>
+          <p:style>
+            <a:lnRef idx="1">
+              <a:schemeClr val="accent1"/>
+            </a:lnRef>
+            <a:fillRef idx="0">
+              <a:schemeClr val="accent1"/>
+            </a:fillRef>
+            <a:effectRef idx="0">
+              <a:schemeClr val="accent1"/>
+            </a:effectRef>
+            <a:fontRef idx="minor">
+              <a:schemeClr val="tx1"/>
+            </a:fontRef>
+          </p:style>
+        </p:cxnSp>
+        <p:cxnSp>
+          <p:nvCxnSpPr>
+            <p:cNvPr id="69" name="Straight Connector 68">
+              <a:extLst>
+                <a:ext uri="{FF2B5EF4-FFF2-40B4-BE49-F238E27FC236}">
+                  <a16:creationId xmlns:a16="http://schemas.microsoft.com/office/drawing/2014/main" id="{B500709F-3ED7-BA61-D719-0C102CB4AC16}"/>
+                </a:ext>
+              </a:extLst>
+            </p:cNvPr>
+            <p:cNvCxnSpPr>
+              <a:cxnSpLocks/>
+              <a:stCxn id="53" idx="3"/>
+              <a:endCxn id="48" idx="3"/>
+            </p:cNvCxnSpPr>
+            <p:nvPr/>
+          </p:nvCxnSpPr>
+          <p:spPr>
+            <a:xfrm flipH="1" flipV="1">
+              <a:off x="5379719" y="4625341"/>
+              <a:ext cx="762000" cy="140886"/>
+            </a:xfrm>
+            <a:prstGeom prst="line">
+              <a:avLst/>
+            </a:prstGeom>
+          </p:spPr>
+          <p:style>
+            <a:lnRef idx="1">
+              <a:schemeClr val="accent1"/>
+            </a:lnRef>
+            <a:fillRef idx="0">
+              <a:schemeClr val="accent1"/>
+            </a:fillRef>
+            <a:effectRef idx="0">
+              <a:schemeClr val="accent1"/>
+            </a:effectRef>
+            <a:fontRef idx="minor">
+              <a:schemeClr val="tx1"/>
+            </a:fontRef>
+          </p:style>
+        </p:cxnSp>
+        <p:cxnSp>
+          <p:nvCxnSpPr>
+            <p:cNvPr id="91" name="Straight Connector 90">
+              <a:extLst>
+                <a:ext uri="{FF2B5EF4-FFF2-40B4-BE49-F238E27FC236}">
+                  <a16:creationId xmlns:a16="http://schemas.microsoft.com/office/drawing/2014/main" id="{3B78D421-B276-2F4E-124C-B8E340062BFC}"/>
+                </a:ext>
+              </a:extLst>
+            </p:cNvPr>
+            <p:cNvCxnSpPr>
+              <a:cxnSpLocks/>
+              <a:stCxn id="56" idx="1"/>
+              <a:endCxn id="53" idx="3"/>
+            </p:cNvCxnSpPr>
+            <p:nvPr/>
+          </p:nvCxnSpPr>
+          <p:spPr>
+            <a:xfrm flipH="1">
+              <a:off x="6141719" y="4425744"/>
+              <a:ext cx="895272" cy="340483"/>
+            </a:xfrm>
+            <a:prstGeom prst="line">
+              <a:avLst/>
+            </a:prstGeom>
+          </p:spPr>
+          <p:style>
+            <a:lnRef idx="1">
+              <a:schemeClr val="accent1"/>
+            </a:lnRef>
+            <a:fillRef idx="0">
+              <a:schemeClr val="accent1"/>
+            </a:fillRef>
+            <a:effectRef idx="0">
+              <a:schemeClr val="accent1"/>
+            </a:effectRef>
+            <a:fontRef idx="minor">
+              <a:schemeClr val="tx1"/>
+            </a:fontRef>
+          </p:style>
+        </p:cxnSp>
+      </p:grpSp>
+      <p:sp>
+        <p:nvSpPr>
+          <p:cNvPr id="39" name="Oval 38">
+            <a:extLst>
+              <a:ext uri="{FF2B5EF4-FFF2-40B4-BE49-F238E27FC236}">
+                <a16:creationId xmlns:a16="http://schemas.microsoft.com/office/drawing/2014/main" id="{9E439E53-8652-9235-6F20-3D528ED0772B}"/>
+              </a:ext>
+            </a:extLst>
+          </p:cNvPr>
+          <p:cNvSpPr>
+            <a:spLocks/>
+          </p:cNvSpPr>
+          <p:nvPr/>
+        </p:nvSpPr>
+        <p:spPr>
+          <a:xfrm rot="4326878">
+            <a:off x="1421807" y="2762712"/>
+            <a:ext cx="228600" cy="228600"/>
+          </a:xfrm>
+          <a:prstGeom prst="ellipse">
+            <a:avLst/>
+          </a:prstGeom>
+          <a:solidFill>
+            <a:schemeClr val="tx1">
+              <a:lumMod val="85000"/>
+              <a:lumOff val="15000"/>
+            </a:schemeClr>
+          </a:solidFill>
+          <a:ln w="50800">
+            <a:noFill/>
+          </a:ln>
+        </p:spPr>
+        <p:style>
+          <a:lnRef idx="2">
+            <a:schemeClr val="accent1">
+              <a:shade val="15000"/>
+            </a:schemeClr>
+          </a:lnRef>
+          <a:fillRef idx="1">
+            <a:schemeClr val="accent1"/>
+          </a:fillRef>
+          <a:effectRef idx="0">
+            <a:schemeClr val="accent1"/>
+          </a:effectRef>
+          <a:fontRef idx="minor">
+            <a:schemeClr val="lt1"/>
+          </a:fontRef>
+        </p:style>
+        <p:txBody>
+          <a:bodyPr rtlCol="0" anchor="ctr"/>
+          <a:lstStyle/>
+          <a:p>
+            <a:pPr algn="ctr"/>
+            <a:endParaRPr lang="en-US"/>
+          </a:p>
+        </p:txBody>
+      </p:sp>
+      <p:sp>
+        <p:nvSpPr>
+          <p:cNvPr id="40" name="Oval 39">
+            <a:extLst>
+              <a:ext uri="{FF2B5EF4-FFF2-40B4-BE49-F238E27FC236}">
+                <a16:creationId xmlns:a16="http://schemas.microsoft.com/office/drawing/2014/main" id="{7A252028-79EE-A2B7-BCCE-6DCD70044E33}"/>
+              </a:ext>
+            </a:extLst>
+          </p:cNvPr>
+          <p:cNvSpPr>
+            <a:spLocks/>
+          </p:cNvSpPr>
+          <p:nvPr/>
+        </p:nvSpPr>
+        <p:spPr>
+          <a:xfrm>
+            <a:off x="3035415" y="3214731"/>
+            <a:ext cx="228600" cy="228600"/>
+          </a:xfrm>
+          <a:prstGeom prst="ellipse">
+            <a:avLst/>
+          </a:prstGeom>
+          <a:solidFill>
+            <a:schemeClr val="tx1">
+              <a:lumMod val="85000"/>
+              <a:lumOff val="15000"/>
+            </a:schemeClr>
+          </a:solidFill>
+          <a:ln>
+            <a:noFill/>
+          </a:ln>
+        </p:spPr>
+        <p:style>
+          <a:lnRef idx="2">
+            <a:schemeClr val="accent1">
+              <a:shade val="15000"/>
+            </a:schemeClr>
+          </a:lnRef>
+          <a:fillRef idx="1">
+            <a:schemeClr val="accent1"/>
+          </a:fillRef>
+          <a:effectRef idx="0">
+            <a:schemeClr val="accent1"/>
+          </a:effectRef>
+          <a:fontRef idx="minor">
+            <a:schemeClr val="lt1"/>
+          </a:fontRef>
+        </p:style>
+        <p:txBody>
+          <a:bodyPr rtlCol="0" anchor="ctr"/>
+          <a:lstStyle/>
+          <a:p>
+            <a:pPr algn="ctr"/>
+            <a:endParaRPr lang="en-US"/>
+          </a:p>
+        </p:txBody>
+      </p:sp>
+      <p:sp>
+        <p:nvSpPr>
+          <p:cNvPr id="41" name="Oval 40">
+            <a:extLst>
+              <a:ext uri="{FF2B5EF4-FFF2-40B4-BE49-F238E27FC236}">
+                <a16:creationId xmlns:a16="http://schemas.microsoft.com/office/drawing/2014/main" id="{3D1FA3F3-0AE6-DFBA-4CE6-04FE8EC8AB41}"/>
+              </a:ext>
+            </a:extLst>
+          </p:cNvPr>
+          <p:cNvSpPr>
+            <a:spLocks/>
+          </p:cNvSpPr>
+          <p:nvPr/>
+        </p:nvSpPr>
+        <p:spPr>
+          <a:xfrm>
+            <a:off x="3715428" y="2808431"/>
+            <a:ext cx="228600" cy="228600"/>
+          </a:xfrm>
+          <a:prstGeom prst="ellipse">
+            <a:avLst/>
+          </a:prstGeom>
+          <a:solidFill>
+            <a:schemeClr val="tx1">
+              <a:lumMod val="85000"/>
+              <a:lumOff val="15000"/>
+            </a:schemeClr>
+          </a:solidFill>
+          <a:ln w="50800">
+            <a:noFill/>
+          </a:ln>
+        </p:spPr>
+        <p:style>
+          <a:lnRef idx="2">
+            <a:schemeClr val="accent1">
+              <a:shade val="15000"/>
+            </a:schemeClr>
+          </a:lnRef>
+          <a:fillRef idx="1">
+            <a:schemeClr val="accent1"/>
+          </a:fillRef>
+          <a:effectRef idx="0">
+            <a:schemeClr val="accent1"/>
+          </a:effectRef>
+          <a:fontRef idx="minor">
+            <a:schemeClr val="lt1"/>
+          </a:fontRef>
+        </p:style>
+        <p:txBody>
+          <a:bodyPr rtlCol="0" anchor="ctr"/>
+          <a:lstStyle/>
+          <a:p>
+            <a:pPr algn="ctr"/>
+            <a:endParaRPr lang="en-US"/>
+          </a:p>
+        </p:txBody>
+      </p:sp>
+      <p:sp>
+        <p:nvSpPr>
+          <p:cNvPr id="42" name="Oval 41">
+            <a:extLst>
+              <a:ext uri="{FF2B5EF4-FFF2-40B4-BE49-F238E27FC236}">
+                <a16:creationId xmlns:a16="http://schemas.microsoft.com/office/drawing/2014/main" id="{194E096B-D770-3D5E-1817-FBBC35D2B989}"/>
+              </a:ext>
+            </a:extLst>
+          </p:cNvPr>
+          <p:cNvSpPr>
+            <a:spLocks/>
+          </p:cNvSpPr>
+          <p:nvPr/>
+        </p:nvSpPr>
+        <p:spPr>
+          <a:xfrm>
+            <a:off x="2420029" y="2133406"/>
+            <a:ext cx="228600" cy="228600"/>
+          </a:xfrm>
+          <a:prstGeom prst="ellipse">
+            <a:avLst/>
+          </a:prstGeom>
+          <a:solidFill>
+            <a:schemeClr val="tx1">
+              <a:lumMod val="85000"/>
+              <a:lumOff val="15000"/>
+            </a:schemeClr>
+          </a:solidFill>
+          <a:ln w="50800">
+            <a:noFill/>
+          </a:ln>
+        </p:spPr>
+        <p:style>
+          <a:lnRef idx="2">
+            <a:schemeClr val="accent1">
+              <a:shade val="15000"/>
+            </a:schemeClr>
+          </a:lnRef>
+          <a:fillRef idx="1">
+            <a:schemeClr val="accent1"/>
+          </a:fillRef>
+          <a:effectRef idx="0">
+            <a:schemeClr val="accent1"/>
+          </a:effectRef>
+          <a:fontRef idx="minor">
+            <a:schemeClr val="lt1"/>
+          </a:fontRef>
+        </p:style>
+        <p:txBody>
+          <a:bodyPr rtlCol="0" anchor="ctr"/>
+          <a:lstStyle/>
+          <a:p>
+            <a:pPr algn="ctr"/>
+            <a:endParaRPr lang="en-US"/>
+          </a:p>
+        </p:txBody>
+      </p:sp>
+      <p:sp>
+        <p:nvSpPr>
+          <p:cNvPr id="43" name="Oval 42">
+            <a:extLst>
+              <a:ext uri="{FF2B5EF4-FFF2-40B4-BE49-F238E27FC236}">
+                <a16:creationId xmlns:a16="http://schemas.microsoft.com/office/drawing/2014/main" id="{CA911564-D630-1D79-3D08-9B249A0B1844}"/>
+              </a:ext>
+            </a:extLst>
+          </p:cNvPr>
+          <p:cNvSpPr>
+            <a:spLocks/>
+          </p:cNvSpPr>
+          <p:nvPr/>
+        </p:nvSpPr>
+        <p:spPr>
+          <a:xfrm>
+            <a:off x="3103517" y="2547759"/>
+            <a:ext cx="228600" cy="228600"/>
+          </a:xfrm>
+          <a:prstGeom prst="ellipse">
+            <a:avLst/>
+          </a:prstGeom>
+          <a:solidFill>
+            <a:schemeClr val="tx1">
+              <a:lumMod val="85000"/>
+              <a:lumOff val="15000"/>
+            </a:schemeClr>
+          </a:solidFill>
+          <a:ln w="50800">
+            <a:noFill/>
+          </a:ln>
+        </p:spPr>
+        <p:style>
+          <a:lnRef idx="2">
+            <a:schemeClr val="accent1">
+              <a:shade val="15000"/>
+            </a:schemeClr>
+          </a:lnRef>
+          <a:fillRef idx="1">
+            <a:schemeClr val="accent1"/>
+          </a:fillRef>
+          <a:effectRef idx="0">
+            <a:schemeClr val="accent1"/>
+          </a:effectRef>
+          <a:fontRef idx="minor">
+            <a:schemeClr val="lt1"/>
+          </a:fontRef>
+        </p:style>
+        <p:txBody>
+          <a:bodyPr rtlCol="0" anchor="ctr"/>
+          <a:lstStyle/>
+          <a:p>
+            <a:pPr algn="ctr"/>
+            <a:endParaRPr lang="en-US"/>
+          </a:p>
+        </p:txBody>
+      </p:sp>
+      <p:sp>
+        <p:nvSpPr>
+          <p:cNvPr id="44" name="Oval 43">
+            <a:extLst>
+              <a:ext uri="{FF2B5EF4-FFF2-40B4-BE49-F238E27FC236}">
+                <a16:creationId xmlns:a16="http://schemas.microsoft.com/office/drawing/2014/main" id="{B4EE2AD3-D932-95D6-ACAC-5F0D18EF00B3}"/>
+              </a:ext>
+            </a:extLst>
+          </p:cNvPr>
+          <p:cNvSpPr>
+            <a:spLocks/>
+          </p:cNvSpPr>
+          <p:nvPr/>
+        </p:nvSpPr>
+        <p:spPr>
+          <a:xfrm>
+            <a:off x="1858380" y="3508035"/>
+            <a:ext cx="228600" cy="228600"/>
+          </a:xfrm>
+          <a:prstGeom prst="ellipse">
+            <a:avLst/>
+          </a:prstGeom>
+          <a:solidFill>
+            <a:schemeClr val="tx1">
+              <a:lumMod val="85000"/>
+              <a:lumOff val="15000"/>
+            </a:schemeClr>
+          </a:solidFill>
+          <a:ln>
+            <a:noFill/>
+          </a:ln>
+        </p:spPr>
+        <p:style>
+          <a:lnRef idx="2">
+            <a:schemeClr val="accent1">
+              <a:shade val="15000"/>
+            </a:schemeClr>
+          </a:lnRef>
+          <a:fillRef idx="1">
+            <a:schemeClr val="accent1"/>
+          </a:fillRef>
+          <a:effectRef idx="0">
+            <a:schemeClr val="accent1"/>
+          </a:effectRef>
+          <a:fontRef idx="minor">
+            <a:schemeClr val="lt1"/>
+          </a:fontRef>
+        </p:style>
+        <p:txBody>
+          <a:bodyPr rtlCol="0" anchor="ctr"/>
+          <a:lstStyle/>
+          <a:p>
+            <a:pPr algn="ctr"/>
+            <a:endParaRPr lang="en-US"/>
+          </a:p>
+        </p:txBody>
+      </p:sp>
+      <p:sp>
+        <p:nvSpPr>
+          <p:cNvPr id="45" name="Oval 44">
+            <a:extLst>
+              <a:ext uri="{FF2B5EF4-FFF2-40B4-BE49-F238E27FC236}">
+                <a16:creationId xmlns:a16="http://schemas.microsoft.com/office/drawing/2014/main" id="{BEF92B59-289F-F3D5-2A42-A89E6AF966D8}"/>
+              </a:ext>
+            </a:extLst>
+          </p:cNvPr>
+          <p:cNvSpPr>
+            <a:spLocks/>
+          </p:cNvSpPr>
+          <p:nvPr/>
+        </p:nvSpPr>
+        <p:spPr>
+          <a:xfrm>
+            <a:off x="2148501" y="2902742"/>
+            <a:ext cx="228600" cy="228600"/>
+          </a:xfrm>
+          <a:prstGeom prst="ellipse">
+            <a:avLst/>
+          </a:prstGeom>
+          <a:solidFill>
+            <a:schemeClr val="tx1">
+              <a:lumMod val="85000"/>
+              <a:lumOff val="15000"/>
+            </a:schemeClr>
+          </a:solidFill>
+          <a:ln>
+            <a:noFill/>
+          </a:ln>
+        </p:spPr>
+        <p:style>
+          <a:lnRef idx="2">
+            <a:schemeClr val="accent1">
+              <a:shade val="15000"/>
+            </a:schemeClr>
+          </a:lnRef>
+          <a:fillRef idx="1">
+            <a:schemeClr val="accent1"/>
+          </a:fillRef>
+          <a:effectRef idx="0">
+            <a:schemeClr val="accent1"/>
+          </a:effectRef>
+          <a:fontRef idx="minor">
+            <a:schemeClr val="lt1"/>
+          </a:fontRef>
+        </p:style>
+        <p:txBody>
+          <a:bodyPr rtlCol="0" anchor="ctr"/>
+          <a:lstStyle/>
+          <a:p>
+            <a:pPr algn="ctr"/>
+            <a:endParaRPr lang="en-US"/>
+          </a:p>
+        </p:txBody>
+      </p:sp>
+      <p:sp>
+        <p:nvSpPr>
+          <p:cNvPr id="46" name="Oval 45">
+            <a:extLst>
+              <a:ext uri="{FF2B5EF4-FFF2-40B4-BE49-F238E27FC236}">
+                <a16:creationId xmlns:a16="http://schemas.microsoft.com/office/drawing/2014/main" id="{E16C36DE-68DB-F73F-4B71-699F584C4CBA}"/>
+              </a:ext>
+            </a:extLst>
+          </p:cNvPr>
+          <p:cNvSpPr>
+            <a:spLocks/>
+          </p:cNvSpPr>
+          <p:nvPr/>
+        </p:nvSpPr>
+        <p:spPr>
+          <a:xfrm>
+            <a:off x="3239098" y="1923718"/>
+            <a:ext cx="228600" cy="228600"/>
+          </a:xfrm>
+          <a:prstGeom prst="ellipse">
+            <a:avLst/>
+          </a:prstGeom>
+          <a:solidFill>
+            <a:schemeClr val="tx1">
+              <a:lumMod val="85000"/>
+              <a:lumOff val="15000"/>
+            </a:schemeClr>
+          </a:solidFill>
+          <a:ln>
+            <a:noFill/>
+          </a:ln>
+        </p:spPr>
+        <p:style>
+          <a:lnRef idx="2">
+            <a:schemeClr val="accent1">
+              <a:shade val="15000"/>
+            </a:schemeClr>
+          </a:lnRef>
+          <a:fillRef idx="1">
+            <a:schemeClr val="accent1"/>
+          </a:fillRef>
+          <a:effectRef idx="0">
+            <a:schemeClr val="accent1"/>
+          </a:effectRef>
+          <a:fontRef idx="minor">
+            <a:schemeClr val="lt1"/>
+          </a:fontRef>
+        </p:style>
+        <p:txBody>
+          <a:bodyPr rtlCol="0" anchor="ctr"/>
+          <a:lstStyle/>
+          <a:p>
+            <a:pPr algn="ctr"/>
+            <a:endParaRPr lang="en-US"/>
+          </a:p>
+        </p:txBody>
+      </p:sp>
+      <p:grpSp>
+        <p:nvGrpSpPr>
+          <p:cNvPr id="1052" name="Group 1051">
+            <a:extLst>
+              <a:ext uri="{FF2B5EF4-FFF2-40B4-BE49-F238E27FC236}">
+                <a16:creationId xmlns:a16="http://schemas.microsoft.com/office/drawing/2014/main" id="{34CB18D8-FE9C-2344-44CB-7D9440E01D15}"/>
+              </a:ext>
+            </a:extLst>
+          </p:cNvPr>
+          <p:cNvGrpSpPr/>
+          <p:nvPr/>
+        </p:nvGrpSpPr>
+        <p:grpSpPr>
+          <a:xfrm>
+            <a:off x="4724400" y="5067778"/>
+            <a:ext cx="2514600" cy="1005838"/>
+            <a:chOff x="4966008" y="3871545"/>
+            <a:chExt cx="2514600" cy="1005838"/>
+          </a:xfrm>
+        </p:grpSpPr>
+        <p:sp>
+          <p:nvSpPr>
+            <p:cNvPr id="1053" name="Rectangle 1052">
+              <a:extLst>
+                <a:ext uri="{FF2B5EF4-FFF2-40B4-BE49-F238E27FC236}">
+                  <a16:creationId xmlns:a16="http://schemas.microsoft.com/office/drawing/2014/main" id="{62605BD0-D51C-B685-A132-8AB1D9D4429E}"/>
+                </a:ext>
+              </a:extLst>
+            </p:cNvPr>
+            <p:cNvSpPr/>
+            <p:nvPr/>
+          </p:nvSpPr>
+          <p:spPr>
+            <a:xfrm>
+              <a:off x="5270808" y="4755464"/>
+              <a:ext cx="45719" cy="45719"/>
+            </a:xfrm>
+            <a:prstGeom prst="rect">
+              <a:avLst/>
+            </a:prstGeom>
+          </p:spPr>
+          <p:style>
+            <a:lnRef idx="2">
+              <a:schemeClr val="accent1">
+                <a:shade val="15000"/>
+              </a:schemeClr>
+            </a:lnRef>
+            <a:fillRef idx="1">
+              <a:schemeClr val="accent1"/>
+            </a:fillRef>
+            <a:effectRef idx="0">
+              <a:schemeClr val="accent1"/>
+            </a:effectRef>
+            <a:fontRef idx="minor">
+              <a:schemeClr val="lt1"/>
+            </a:fontRef>
+          </p:style>
+          <p:txBody>
+            <a:bodyPr rtlCol="0" anchor="ctr"/>
+            <a:lstStyle/>
+            <a:p>
+              <a:pPr algn="ctr"/>
+              <a:endParaRPr lang="en-US"/>
+            </a:p>
+          </p:txBody>
+        </p:sp>
+        <p:sp>
+          <p:nvSpPr>
+            <p:cNvPr id="1054" name="Rectangle 1053">
+              <a:extLst>
+                <a:ext uri="{FF2B5EF4-FFF2-40B4-BE49-F238E27FC236}">
+                  <a16:creationId xmlns:a16="http://schemas.microsoft.com/office/drawing/2014/main" id="{A0B24CA6-0D95-043E-47B0-7AC875DEC074}"/>
+                </a:ext>
+              </a:extLst>
+            </p:cNvPr>
+            <p:cNvSpPr/>
+            <p:nvPr/>
+          </p:nvSpPr>
+          <p:spPr>
+            <a:xfrm>
+              <a:off x="6355081" y="3967732"/>
+              <a:ext cx="45719" cy="45719"/>
+            </a:xfrm>
+            <a:prstGeom prst="rect">
+              <a:avLst/>
+            </a:prstGeom>
+          </p:spPr>
+          <p:style>
+            <a:lnRef idx="2">
+              <a:schemeClr val="accent1">
+                <a:shade val="15000"/>
+              </a:schemeClr>
+            </a:lnRef>
+            <a:fillRef idx="1">
+              <a:schemeClr val="accent1"/>
+            </a:fillRef>
+            <a:effectRef idx="0">
+              <a:schemeClr val="accent1"/>
+            </a:effectRef>
+            <a:fontRef idx="minor">
+              <a:schemeClr val="lt1"/>
+            </a:fontRef>
+          </p:style>
+          <p:txBody>
+            <a:bodyPr rtlCol="0" anchor="ctr"/>
+            <a:lstStyle/>
+            <a:p>
+              <a:pPr algn="ctr"/>
+              <a:endParaRPr lang="en-US"/>
+            </a:p>
+          </p:txBody>
+        </p:sp>
+        <p:sp>
+          <p:nvSpPr>
+            <p:cNvPr id="1055" name="Rectangle 1054">
+              <a:extLst>
+                <a:ext uri="{FF2B5EF4-FFF2-40B4-BE49-F238E27FC236}">
+                  <a16:creationId xmlns:a16="http://schemas.microsoft.com/office/drawing/2014/main" id="{FA41744B-61E4-80A8-6AC0-09DEE490AA17}"/>
+                </a:ext>
+              </a:extLst>
+            </p:cNvPr>
+            <p:cNvSpPr/>
+            <p:nvPr/>
+          </p:nvSpPr>
+          <p:spPr>
+            <a:xfrm>
+              <a:off x="7434889" y="4831664"/>
+              <a:ext cx="45719" cy="45719"/>
+            </a:xfrm>
+            <a:prstGeom prst="rect">
+              <a:avLst/>
+            </a:prstGeom>
+          </p:spPr>
+          <p:style>
+            <a:lnRef idx="2">
+              <a:schemeClr val="accent1">
+                <a:shade val="15000"/>
+              </a:schemeClr>
+            </a:lnRef>
+            <a:fillRef idx="1">
+              <a:schemeClr val="accent1"/>
+            </a:fillRef>
+            <a:effectRef idx="0">
+              <a:schemeClr val="accent1"/>
+            </a:effectRef>
+            <a:fontRef idx="minor">
+              <a:schemeClr val="lt1"/>
+            </a:fontRef>
+          </p:style>
+          <p:txBody>
+            <a:bodyPr rtlCol="0" anchor="ctr"/>
+            <a:lstStyle/>
+            <a:p>
+              <a:pPr algn="ctr"/>
+              <a:endParaRPr lang="en-US"/>
+            </a:p>
+          </p:txBody>
+        </p:sp>
+        <p:sp>
+          <p:nvSpPr>
+            <p:cNvPr id="1056" name="Rectangle 1055">
+              <a:extLst>
+                <a:ext uri="{FF2B5EF4-FFF2-40B4-BE49-F238E27FC236}">
+                  <a16:creationId xmlns:a16="http://schemas.microsoft.com/office/drawing/2014/main" id="{5F83F5AD-641F-4F90-C148-05E123EBFB19}"/>
+                </a:ext>
+              </a:extLst>
+            </p:cNvPr>
+            <p:cNvSpPr/>
+            <p:nvPr/>
+          </p:nvSpPr>
+          <p:spPr>
+            <a:xfrm>
+              <a:off x="7099608" y="3947745"/>
+              <a:ext cx="45719" cy="45719"/>
+            </a:xfrm>
+            <a:prstGeom prst="rect">
+              <a:avLst/>
+            </a:prstGeom>
+          </p:spPr>
+          <p:style>
+            <a:lnRef idx="2">
+              <a:schemeClr val="accent1">
+                <a:shade val="15000"/>
+              </a:schemeClr>
+            </a:lnRef>
+            <a:fillRef idx="1">
+              <a:schemeClr val="accent1"/>
+            </a:fillRef>
+            <a:effectRef idx="0">
+              <a:schemeClr val="accent1"/>
+            </a:effectRef>
+            <a:fontRef idx="minor">
+              <a:schemeClr val="lt1"/>
+            </a:fontRef>
+          </p:style>
+          <p:txBody>
+            <a:bodyPr rtlCol="0" anchor="ctr"/>
+            <a:lstStyle/>
+            <a:p>
+              <a:pPr algn="ctr"/>
+              <a:endParaRPr lang="en-US"/>
+            </a:p>
+          </p:txBody>
+        </p:sp>
+        <p:sp>
+          <p:nvSpPr>
+            <p:cNvPr id="1057" name="Rectangle 1056">
+              <a:extLst>
+                <a:ext uri="{FF2B5EF4-FFF2-40B4-BE49-F238E27FC236}">
+                  <a16:creationId xmlns:a16="http://schemas.microsoft.com/office/drawing/2014/main" id="{DD22579A-A630-2D4F-1735-5094811D3412}"/>
+                </a:ext>
+              </a:extLst>
+            </p:cNvPr>
+            <p:cNvSpPr/>
+            <p:nvPr/>
+          </p:nvSpPr>
+          <p:spPr>
+            <a:xfrm>
+              <a:off x="4966008" y="3917264"/>
+              <a:ext cx="45719" cy="45719"/>
+            </a:xfrm>
+            <a:prstGeom prst="rect">
+              <a:avLst/>
+            </a:prstGeom>
+          </p:spPr>
+          <p:style>
+            <a:lnRef idx="2">
+              <a:schemeClr val="accent1">
+                <a:shade val="15000"/>
+              </a:schemeClr>
+            </a:lnRef>
+            <a:fillRef idx="1">
+              <a:schemeClr val="accent1"/>
+            </a:fillRef>
+            <a:effectRef idx="0">
+              <a:schemeClr val="accent1"/>
+            </a:effectRef>
+            <a:fontRef idx="minor">
+              <a:schemeClr val="lt1"/>
+            </a:fontRef>
+          </p:style>
+          <p:txBody>
+            <a:bodyPr rtlCol="0" anchor="ctr"/>
+            <a:lstStyle/>
+            <a:p>
+              <a:pPr algn="ctr"/>
+              <a:endParaRPr lang="en-US"/>
+            </a:p>
+          </p:txBody>
+        </p:sp>
+        <p:sp>
+          <p:nvSpPr>
+            <p:cNvPr id="1058" name="Rectangle 1057">
+              <a:extLst>
+                <a:ext uri="{FF2B5EF4-FFF2-40B4-BE49-F238E27FC236}">
+                  <a16:creationId xmlns:a16="http://schemas.microsoft.com/office/drawing/2014/main" id="{AC682F32-67F3-FD00-32EE-D42F0CA5AFDF}"/>
+                </a:ext>
+              </a:extLst>
+            </p:cNvPr>
+            <p:cNvSpPr/>
+            <p:nvPr/>
+          </p:nvSpPr>
+          <p:spPr>
+            <a:xfrm>
+              <a:off x="5804208" y="3871545"/>
+              <a:ext cx="45719" cy="45719"/>
+            </a:xfrm>
+            <a:prstGeom prst="rect">
+              <a:avLst/>
+            </a:prstGeom>
+          </p:spPr>
+          <p:style>
+            <a:lnRef idx="2">
+              <a:schemeClr val="accent1">
+                <a:shade val="15000"/>
+              </a:schemeClr>
+            </a:lnRef>
+            <a:fillRef idx="1">
+              <a:schemeClr val="accent1"/>
+            </a:fillRef>
+            <a:effectRef idx="0">
+              <a:schemeClr val="accent1"/>
+            </a:effectRef>
+            <a:fontRef idx="minor">
+              <a:schemeClr val="lt1"/>
+            </a:fontRef>
+          </p:style>
+          <p:txBody>
+            <a:bodyPr rtlCol="0" anchor="ctr"/>
+            <a:lstStyle/>
+            <a:p>
+              <a:pPr algn="ctr"/>
+              <a:endParaRPr lang="en-US"/>
+            </a:p>
+          </p:txBody>
+        </p:sp>
+        <p:sp>
+          <p:nvSpPr>
+            <p:cNvPr id="1059" name="Rectangle 1058">
+              <a:extLst>
+                <a:ext uri="{FF2B5EF4-FFF2-40B4-BE49-F238E27FC236}">
+                  <a16:creationId xmlns:a16="http://schemas.microsoft.com/office/drawing/2014/main" id="{6C0F39C8-487D-BD58-1CCE-63B4BB204085}"/>
+                </a:ext>
+              </a:extLst>
+            </p:cNvPr>
+            <p:cNvSpPr/>
+            <p:nvPr/>
+          </p:nvSpPr>
+          <p:spPr>
+            <a:xfrm>
+              <a:off x="6109008" y="4755464"/>
+              <a:ext cx="45719" cy="45719"/>
+            </a:xfrm>
+            <a:prstGeom prst="rect">
+              <a:avLst/>
+            </a:prstGeom>
+          </p:spPr>
+          <p:style>
+            <a:lnRef idx="2">
+              <a:schemeClr val="accent1">
+                <a:shade val="15000"/>
+              </a:schemeClr>
+            </a:lnRef>
+            <a:fillRef idx="1">
+              <a:schemeClr val="accent1"/>
+            </a:fillRef>
+            <a:effectRef idx="0">
+              <a:schemeClr val="accent1"/>
+            </a:effectRef>
+            <a:fontRef idx="minor">
+              <a:schemeClr val="lt1"/>
+            </a:fontRef>
+          </p:style>
+          <p:txBody>
+            <a:bodyPr rtlCol="0" anchor="ctr"/>
+            <a:lstStyle/>
+            <a:p>
+              <a:pPr algn="ctr"/>
+              <a:endParaRPr lang="en-US"/>
+            </a:p>
+          </p:txBody>
+        </p:sp>
+        <p:sp>
+          <p:nvSpPr>
+            <p:cNvPr id="1060" name="Rectangle 1059">
+              <a:extLst>
+                <a:ext uri="{FF2B5EF4-FFF2-40B4-BE49-F238E27FC236}">
+                  <a16:creationId xmlns:a16="http://schemas.microsoft.com/office/drawing/2014/main" id="{F0DD9A9B-E8CE-2420-B3A8-D78209C3A657}"/>
+                </a:ext>
+              </a:extLst>
+            </p:cNvPr>
+            <p:cNvSpPr/>
+            <p:nvPr/>
+          </p:nvSpPr>
+          <p:spPr>
+            <a:xfrm>
+              <a:off x="6825289" y="4831664"/>
+              <a:ext cx="45719" cy="45719"/>
+            </a:xfrm>
+            <a:prstGeom prst="rect">
+              <a:avLst/>
+            </a:prstGeom>
+          </p:spPr>
+          <p:style>
+            <a:lnRef idx="2">
+              <a:schemeClr val="accent1">
+                <a:shade val="15000"/>
+              </a:schemeClr>
+            </a:lnRef>
+            <a:fillRef idx="1">
+              <a:schemeClr val="accent1"/>
+            </a:fillRef>
+            <a:effectRef idx="0">
+              <a:schemeClr val="accent1"/>
+            </a:effectRef>
+            <a:fontRef idx="minor">
+              <a:schemeClr val="lt1"/>
+            </a:fontRef>
+          </p:style>
+          <p:txBody>
+            <a:bodyPr rtlCol="0" anchor="ctr"/>
+            <a:lstStyle/>
+            <a:p>
+              <a:pPr algn="ctr"/>
+              <a:endParaRPr lang="en-US"/>
+            </a:p>
+          </p:txBody>
+        </p:sp>
+        <p:cxnSp>
+          <p:nvCxnSpPr>
+            <p:cNvPr id="1061" name="Straight Connector 1060">
+              <a:extLst>
+                <a:ext uri="{FF2B5EF4-FFF2-40B4-BE49-F238E27FC236}">
+                  <a16:creationId xmlns:a16="http://schemas.microsoft.com/office/drawing/2014/main" id="{179DD014-AE04-3839-0267-DDBA32CA5AF6}"/>
+                </a:ext>
+              </a:extLst>
+            </p:cNvPr>
+            <p:cNvCxnSpPr>
+              <a:cxnSpLocks/>
+              <a:stCxn id="1053" idx="3"/>
+              <a:endCxn id="1054" idx="1"/>
+            </p:cNvCxnSpPr>
+            <p:nvPr/>
+          </p:nvCxnSpPr>
+          <p:spPr>
+            <a:xfrm flipV="1">
+              <a:off x="5316527" y="3990592"/>
+              <a:ext cx="1038554" cy="787732"/>
+            </a:xfrm>
+            <a:prstGeom prst="line">
+              <a:avLst/>
+            </a:prstGeom>
+            <a:ln w="25400">
+              <a:solidFill>
+                <a:srgbClr val="C00000"/>
+              </a:solidFill>
+            </a:ln>
+          </p:spPr>
+          <p:style>
+            <a:lnRef idx="1">
+              <a:schemeClr val="accent1"/>
+            </a:lnRef>
+            <a:fillRef idx="0">
+              <a:schemeClr val="accent1"/>
+            </a:fillRef>
+            <a:effectRef idx="0">
+              <a:schemeClr val="accent1"/>
+            </a:effectRef>
+            <a:fontRef idx="minor">
+              <a:schemeClr val="tx1"/>
+            </a:fontRef>
+          </p:style>
+        </p:cxnSp>
+        <p:cxnSp>
+          <p:nvCxnSpPr>
+            <p:cNvPr id="1062" name="Straight Connector 1061">
+              <a:extLst>
+                <a:ext uri="{FF2B5EF4-FFF2-40B4-BE49-F238E27FC236}">
+                  <a16:creationId xmlns:a16="http://schemas.microsoft.com/office/drawing/2014/main" id="{3395D31D-445A-1124-6BDB-71A07DEA53AD}"/>
+                </a:ext>
+              </a:extLst>
+            </p:cNvPr>
+            <p:cNvCxnSpPr>
+              <a:cxnSpLocks/>
+              <a:stCxn id="1054" idx="3"/>
+              <a:endCxn id="1055" idx="1"/>
+            </p:cNvCxnSpPr>
+            <p:nvPr/>
+          </p:nvCxnSpPr>
+          <p:spPr>
+            <a:xfrm>
+              <a:off x="6400800" y="3990592"/>
+              <a:ext cx="1034089" cy="863932"/>
+            </a:xfrm>
+            <a:prstGeom prst="line">
+              <a:avLst/>
+            </a:prstGeom>
+            <a:ln w="25400">
+              <a:solidFill>
+                <a:srgbClr val="C00000"/>
+              </a:solidFill>
+            </a:ln>
+          </p:spPr>
+          <p:style>
+            <a:lnRef idx="1">
+              <a:schemeClr val="accent1"/>
+            </a:lnRef>
+            <a:fillRef idx="0">
+              <a:schemeClr val="accent1"/>
+            </a:fillRef>
+            <a:effectRef idx="0">
+              <a:schemeClr val="accent1"/>
+            </a:effectRef>
+            <a:fontRef idx="minor">
+              <a:schemeClr val="tx1"/>
+            </a:fontRef>
+          </p:style>
+        </p:cxnSp>
+        <p:cxnSp>
+          <p:nvCxnSpPr>
+            <p:cNvPr id="1063" name="Straight Connector 1062">
+              <a:extLst>
+                <a:ext uri="{FF2B5EF4-FFF2-40B4-BE49-F238E27FC236}">
+                  <a16:creationId xmlns:a16="http://schemas.microsoft.com/office/drawing/2014/main" id="{E414A0FE-7DFA-ECA8-2FBB-EC979888D37C}"/>
+                </a:ext>
+              </a:extLst>
+            </p:cNvPr>
+            <p:cNvCxnSpPr>
+              <a:cxnSpLocks/>
+              <a:stCxn id="1056" idx="2"/>
+              <a:endCxn id="1055" idx="3"/>
+            </p:cNvCxnSpPr>
+            <p:nvPr/>
+          </p:nvCxnSpPr>
+          <p:spPr>
+            <a:xfrm>
+              <a:off x="7122468" y="3993464"/>
+              <a:ext cx="358140" cy="861060"/>
+            </a:xfrm>
+            <a:prstGeom prst="line">
+              <a:avLst/>
+            </a:prstGeom>
+            <a:ln w="25400">
+              <a:solidFill>
+                <a:srgbClr val="C00000"/>
+              </a:solidFill>
+            </a:ln>
+          </p:spPr>
+          <p:style>
+            <a:lnRef idx="1">
+              <a:schemeClr val="accent1"/>
+            </a:lnRef>
+            <a:fillRef idx="0">
+              <a:schemeClr val="accent1"/>
+            </a:fillRef>
+            <a:effectRef idx="0">
+              <a:schemeClr val="accent1"/>
+            </a:effectRef>
+            <a:fontRef idx="minor">
+              <a:schemeClr val="tx1"/>
+            </a:fontRef>
+          </p:style>
+        </p:cxnSp>
+        <p:cxnSp>
+          <p:nvCxnSpPr>
+            <p:cNvPr id="1064" name="Straight Connector 1063">
+              <a:extLst>
+                <a:ext uri="{FF2B5EF4-FFF2-40B4-BE49-F238E27FC236}">
+                  <a16:creationId xmlns:a16="http://schemas.microsoft.com/office/drawing/2014/main" id="{6864709D-838F-262A-06D2-566A3485425A}"/>
+                </a:ext>
+              </a:extLst>
+            </p:cNvPr>
+            <p:cNvCxnSpPr>
+              <a:cxnSpLocks/>
+              <a:stCxn id="1060" idx="2"/>
+              <a:endCxn id="1055" idx="2"/>
+            </p:cNvCxnSpPr>
+            <p:nvPr/>
+          </p:nvCxnSpPr>
+          <p:spPr>
+            <a:xfrm>
+              <a:off x="6848149" y="4877383"/>
+              <a:ext cx="609600" cy="0"/>
+            </a:xfrm>
+            <a:prstGeom prst="line">
+              <a:avLst/>
+            </a:prstGeom>
+            <a:ln w="25400">
+              <a:solidFill>
+                <a:schemeClr val="tx1">
+                  <a:lumMod val="95000"/>
+                  <a:lumOff val="5000"/>
+                </a:schemeClr>
+              </a:solidFill>
+              <a:prstDash val="sysDash"/>
+            </a:ln>
+          </p:spPr>
+          <p:style>
+            <a:lnRef idx="1">
+              <a:schemeClr val="accent1"/>
+            </a:lnRef>
+            <a:fillRef idx="0">
+              <a:schemeClr val="accent1"/>
+            </a:fillRef>
+            <a:effectRef idx="0">
+              <a:schemeClr val="accent1"/>
+            </a:effectRef>
+            <a:fontRef idx="minor">
+              <a:schemeClr val="tx1"/>
+            </a:fontRef>
+          </p:style>
+        </p:cxnSp>
+        <p:cxnSp>
+          <p:nvCxnSpPr>
+            <p:cNvPr id="1065" name="Straight Connector 1064">
+              <a:extLst>
+                <a:ext uri="{FF2B5EF4-FFF2-40B4-BE49-F238E27FC236}">
+                  <a16:creationId xmlns:a16="http://schemas.microsoft.com/office/drawing/2014/main" id="{7D3C6CAC-C36D-1F94-27B9-B192311AE42F}"/>
+                </a:ext>
+              </a:extLst>
+            </p:cNvPr>
+            <p:cNvCxnSpPr>
+              <a:cxnSpLocks/>
+              <a:stCxn id="1056" idx="2"/>
+              <a:endCxn id="1060" idx="0"/>
+            </p:cNvCxnSpPr>
+            <p:nvPr/>
+          </p:nvCxnSpPr>
+          <p:spPr>
+            <a:xfrm flipH="1">
+              <a:off x="6848149" y="3993464"/>
+              <a:ext cx="274319" cy="838200"/>
+            </a:xfrm>
+            <a:prstGeom prst="line">
+              <a:avLst/>
+            </a:prstGeom>
+            <a:ln w="25400">
+              <a:solidFill>
+                <a:srgbClr val="C00000"/>
+              </a:solidFill>
+            </a:ln>
+          </p:spPr>
+          <p:style>
+            <a:lnRef idx="1">
+              <a:schemeClr val="accent1"/>
+            </a:lnRef>
+            <a:fillRef idx="0">
+              <a:schemeClr val="accent1"/>
+            </a:fillRef>
+            <a:effectRef idx="0">
+              <a:schemeClr val="accent1"/>
+            </a:effectRef>
+            <a:fontRef idx="minor">
+              <a:schemeClr val="tx1"/>
+            </a:fontRef>
+          </p:style>
+        </p:cxnSp>
+        <p:cxnSp>
+          <p:nvCxnSpPr>
+            <p:cNvPr id="1066" name="Straight Connector 1065">
+              <a:extLst>
+                <a:ext uri="{FF2B5EF4-FFF2-40B4-BE49-F238E27FC236}">
+                  <a16:creationId xmlns:a16="http://schemas.microsoft.com/office/drawing/2014/main" id="{31B9EBA1-FEAA-8A28-90E6-159279448677}"/>
+                </a:ext>
+              </a:extLst>
+            </p:cNvPr>
+            <p:cNvCxnSpPr>
+              <a:cxnSpLocks/>
+              <a:stCxn id="1059" idx="2"/>
+              <a:endCxn id="1054" idx="2"/>
+            </p:cNvCxnSpPr>
+            <p:nvPr/>
+          </p:nvCxnSpPr>
+          <p:spPr>
+            <a:xfrm flipV="1">
+              <a:off x="6131868" y="4013451"/>
+              <a:ext cx="246073" cy="787732"/>
+            </a:xfrm>
+            <a:prstGeom prst="line">
+              <a:avLst/>
+            </a:prstGeom>
+            <a:ln w="25400">
+              <a:solidFill>
+                <a:srgbClr val="C00000"/>
+              </a:solidFill>
+            </a:ln>
+          </p:spPr>
+          <p:style>
+            <a:lnRef idx="1">
+              <a:schemeClr val="accent1"/>
+            </a:lnRef>
+            <a:fillRef idx="0">
+              <a:schemeClr val="accent1"/>
+            </a:fillRef>
+            <a:effectRef idx="0">
+              <a:schemeClr val="accent1"/>
+            </a:effectRef>
+            <a:fontRef idx="minor">
+              <a:schemeClr val="tx1"/>
+            </a:fontRef>
+          </p:style>
+        </p:cxnSp>
+        <p:cxnSp>
+          <p:nvCxnSpPr>
+            <p:cNvPr id="1067" name="Straight Connector 1066">
+              <a:extLst>
+                <a:ext uri="{FF2B5EF4-FFF2-40B4-BE49-F238E27FC236}">
+                  <a16:creationId xmlns:a16="http://schemas.microsoft.com/office/drawing/2014/main" id="{5A5B4BB4-FE03-E5B4-821C-200E19E3AE4B}"/>
+                </a:ext>
+              </a:extLst>
+            </p:cNvPr>
+            <p:cNvCxnSpPr>
+              <a:cxnSpLocks/>
+              <a:stCxn id="1059" idx="3"/>
+              <a:endCxn id="1056" idx="2"/>
+            </p:cNvCxnSpPr>
+            <p:nvPr/>
+          </p:nvCxnSpPr>
+          <p:spPr>
+            <a:xfrm flipV="1">
+              <a:off x="6154727" y="3993464"/>
+              <a:ext cx="967741" cy="784860"/>
+            </a:xfrm>
+            <a:prstGeom prst="line">
+              <a:avLst/>
+            </a:prstGeom>
+            <a:ln w="25400">
+              <a:solidFill>
+                <a:srgbClr val="C00000"/>
+              </a:solidFill>
+            </a:ln>
+          </p:spPr>
+          <p:style>
+            <a:lnRef idx="1">
+              <a:schemeClr val="accent1"/>
+            </a:lnRef>
+            <a:fillRef idx="0">
+              <a:schemeClr val="accent1"/>
+            </a:fillRef>
+            <a:effectRef idx="0">
+              <a:schemeClr val="accent1"/>
+            </a:effectRef>
+            <a:fontRef idx="minor">
+              <a:schemeClr val="tx1"/>
+            </a:fontRef>
+          </p:style>
+        </p:cxnSp>
+        <p:cxnSp>
+          <p:nvCxnSpPr>
+            <p:cNvPr id="1068" name="Straight Connector 1067">
+              <a:extLst>
+                <a:ext uri="{FF2B5EF4-FFF2-40B4-BE49-F238E27FC236}">
+                  <a16:creationId xmlns:a16="http://schemas.microsoft.com/office/drawing/2014/main" id="{56C3B6DE-37DA-2E08-EBCA-325DECE23B80}"/>
+                </a:ext>
+              </a:extLst>
+            </p:cNvPr>
+            <p:cNvCxnSpPr>
+              <a:cxnSpLocks/>
+              <a:stCxn id="1057" idx="3"/>
+              <a:endCxn id="1059" idx="2"/>
+            </p:cNvCxnSpPr>
+            <p:nvPr/>
+          </p:nvCxnSpPr>
+          <p:spPr>
+            <a:xfrm>
+              <a:off x="5011727" y="3940124"/>
+              <a:ext cx="1120141" cy="861059"/>
+            </a:xfrm>
+            <a:prstGeom prst="line">
+              <a:avLst/>
+            </a:prstGeom>
+            <a:ln w="25400">
+              <a:solidFill>
+                <a:srgbClr val="C00000"/>
+              </a:solidFill>
+            </a:ln>
+          </p:spPr>
+          <p:style>
+            <a:lnRef idx="1">
+              <a:schemeClr val="accent1"/>
+            </a:lnRef>
+            <a:fillRef idx="0">
+              <a:schemeClr val="accent1"/>
+            </a:fillRef>
+            <a:effectRef idx="0">
+              <a:schemeClr val="accent1"/>
+            </a:effectRef>
+            <a:fontRef idx="minor">
+              <a:schemeClr val="tx1"/>
+            </a:fontRef>
+          </p:style>
+        </p:cxnSp>
+        <p:cxnSp>
+          <p:nvCxnSpPr>
+            <p:cNvPr id="1069" name="Straight Connector 1068">
+              <a:extLst>
+                <a:ext uri="{FF2B5EF4-FFF2-40B4-BE49-F238E27FC236}">
+                  <a16:creationId xmlns:a16="http://schemas.microsoft.com/office/drawing/2014/main" id="{8E45C82D-5BD6-4AC6-7A54-407783A1D78D}"/>
+                </a:ext>
+              </a:extLst>
+            </p:cNvPr>
+            <p:cNvCxnSpPr>
+              <a:cxnSpLocks/>
+              <a:stCxn id="1057" idx="3"/>
+              <a:endCxn id="1053" idx="3"/>
+            </p:cNvCxnSpPr>
+            <p:nvPr/>
+          </p:nvCxnSpPr>
+          <p:spPr>
+            <a:xfrm>
+              <a:off x="5011727" y="3940124"/>
+              <a:ext cx="304800" cy="838200"/>
+            </a:xfrm>
+            <a:prstGeom prst="line">
+              <a:avLst/>
+            </a:prstGeom>
+            <a:ln w="25400">
+              <a:solidFill>
+                <a:srgbClr val="C00000"/>
+              </a:solidFill>
+            </a:ln>
+          </p:spPr>
+          <p:style>
+            <a:lnRef idx="1">
+              <a:schemeClr val="accent1"/>
+            </a:lnRef>
+            <a:fillRef idx="0">
+              <a:schemeClr val="accent1"/>
+            </a:fillRef>
+            <a:effectRef idx="0">
+              <a:schemeClr val="accent1"/>
+            </a:effectRef>
+            <a:fontRef idx="minor">
+              <a:schemeClr val="tx1"/>
+            </a:fontRef>
+          </p:style>
+        </p:cxnSp>
+        <p:cxnSp>
+          <p:nvCxnSpPr>
+            <p:cNvPr id="1070" name="Straight Connector 1069">
+              <a:extLst>
+                <a:ext uri="{FF2B5EF4-FFF2-40B4-BE49-F238E27FC236}">
+                  <a16:creationId xmlns:a16="http://schemas.microsoft.com/office/drawing/2014/main" id="{8F326858-58F0-396A-AFBB-FE2753959A99}"/>
+                </a:ext>
+              </a:extLst>
+            </p:cNvPr>
+            <p:cNvCxnSpPr>
+              <a:cxnSpLocks/>
+              <a:stCxn id="1057" idx="3"/>
+              <a:endCxn id="1058" idx="2"/>
+            </p:cNvCxnSpPr>
+            <p:nvPr/>
+          </p:nvCxnSpPr>
+          <p:spPr>
+            <a:xfrm flipV="1">
+              <a:off x="5011727" y="3917264"/>
+              <a:ext cx="815341" cy="22860"/>
+            </a:xfrm>
+            <a:prstGeom prst="line">
+              <a:avLst/>
+            </a:prstGeom>
+            <a:ln w="25400">
+              <a:solidFill>
+                <a:schemeClr val="tx1">
+                  <a:lumMod val="95000"/>
+                  <a:lumOff val="5000"/>
+                </a:schemeClr>
+              </a:solidFill>
+              <a:prstDash val="sysDash"/>
+            </a:ln>
+          </p:spPr>
+          <p:style>
+            <a:lnRef idx="1">
+              <a:schemeClr val="accent1"/>
+            </a:lnRef>
+            <a:fillRef idx="0">
+              <a:schemeClr val="accent1"/>
+            </a:fillRef>
+            <a:effectRef idx="0">
+              <a:schemeClr val="accent1"/>
+            </a:effectRef>
+            <a:fontRef idx="minor">
+              <a:schemeClr val="tx1"/>
+            </a:fontRef>
+          </p:style>
+        </p:cxnSp>
+        <p:cxnSp>
+          <p:nvCxnSpPr>
+            <p:cNvPr id="1071" name="Straight Connector 1070">
+              <a:extLst>
+                <a:ext uri="{FF2B5EF4-FFF2-40B4-BE49-F238E27FC236}">
+                  <a16:creationId xmlns:a16="http://schemas.microsoft.com/office/drawing/2014/main" id="{5E4E5FE7-0632-7341-7123-E873D912513B}"/>
+                </a:ext>
+              </a:extLst>
+            </p:cNvPr>
+            <p:cNvCxnSpPr>
+              <a:cxnSpLocks/>
+              <a:stCxn id="1058" idx="3"/>
+              <a:endCxn id="1053" idx="3"/>
+            </p:cNvCxnSpPr>
+            <p:nvPr/>
+          </p:nvCxnSpPr>
+          <p:spPr>
+            <a:xfrm flipH="1">
+              <a:off x="5316527" y="3894405"/>
+              <a:ext cx="533400" cy="883919"/>
+            </a:xfrm>
+            <a:prstGeom prst="line">
+              <a:avLst/>
+            </a:prstGeom>
+            <a:ln w="25400">
+              <a:solidFill>
+                <a:srgbClr val="C00000"/>
+              </a:solidFill>
+            </a:ln>
+          </p:spPr>
+          <p:style>
+            <a:lnRef idx="1">
+              <a:schemeClr val="accent1"/>
+            </a:lnRef>
+            <a:fillRef idx="0">
+              <a:schemeClr val="accent1"/>
+            </a:fillRef>
+            <a:effectRef idx="0">
+              <a:schemeClr val="accent1"/>
+            </a:effectRef>
+            <a:fontRef idx="minor">
+              <a:schemeClr val="tx1"/>
+            </a:fontRef>
+          </p:style>
+        </p:cxnSp>
+        <p:cxnSp>
+          <p:nvCxnSpPr>
+            <p:cNvPr id="1072" name="Straight Connector 1071">
+              <a:extLst>
+                <a:ext uri="{FF2B5EF4-FFF2-40B4-BE49-F238E27FC236}">
+                  <a16:creationId xmlns:a16="http://schemas.microsoft.com/office/drawing/2014/main" id="{385F24CD-9337-C376-9A3A-F801D5FE1F40}"/>
+                </a:ext>
+              </a:extLst>
+            </p:cNvPr>
+            <p:cNvCxnSpPr>
+              <a:cxnSpLocks/>
+              <a:stCxn id="1060" idx="1"/>
+              <a:endCxn id="1058" idx="3"/>
+            </p:cNvCxnSpPr>
+            <p:nvPr/>
+          </p:nvCxnSpPr>
+          <p:spPr>
+            <a:xfrm flipH="1" flipV="1">
+              <a:off x="5849927" y="3894405"/>
+              <a:ext cx="975362" cy="960119"/>
+            </a:xfrm>
+            <a:prstGeom prst="line">
+              <a:avLst/>
+            </a:prstGeom>
+            <a:ln w="25400">
+              <a:solidFill>
+                <a:srgbClr val="C00000"/>
+              </a:solidFill>
+            </a:ln>
+          </p:spPr>
+          <p:style>
+            <a:lnRef idx="1">
+              <a:schemeClr val="accent1"/>
+            </a:lnRef>
+            <a:fillRef idx="0">
+              <a:schemeClr val="accent1"/>
+            </a:fillRef>
+            <a:effectRef idx="0">
+              <a:schemeClr val="accent1"/>
+            </a:effectRef>
+            <a:fontRef idx="minor">
+              <a:schemeClr val="tx1"/>
+            </a:fontRef>
+          </p:style>
+        </p:cxnSp>
+      </p:grpSp>
+      <p:sp>
+        <p:nvSpPr>
+          <p:cNvPr id="1073" name="Oval 1072">
+            <a:extLst>
+              <a:ext uri="{FF2B5EF4-FFF2-40B4-BE49-F238E27FC236}">
+                <a16:creationId xmlns:a16="http://schemas.microsoft.com/office/drawing/2014/main" id="{0D99AEC3-1393-0DD9-D32A-E13E2749FE77}"/>
+              </a:ext>
+            </a:extLst>
+          </p:cNvPr>
+          <p:cNvSpPr>
+            <a:spLocks/>
+          </p:cNvSpPr>
+          <p:nvPr/>
+        </p:nvSpPr>
+        <p:spPr>
+          <a:xfrm>
+            <a:off x="4931714" y="5850869"/>
+            <a:ext cx="228600" cy="228600"/>
+          </a:xfrm>
+          <a:prstGeom prst="ellipse">
+            <a:avLst/>
+          </a:prstGeom>
+          <a:solidFill>
+            <a:schemeClr val="bg1"/>
+          </a:solidFill>
+          <a:ln w="50800">
+            <a:solidFill>
+              <a:srgbClr val="00B050"/>
+            </a:solidFill>
+          </a:ln>
+        </p:spPr>
+        <p:style>
+          <a:lnRef idx="2">
+            <a:schemeClr val="accent1">
+              <a:shade val="15000"/>
+            </a:schemeClr>
+          </a:lnRef>
+          <a:fillRef idx="1">
+            <a:schemeClr val="accent1"/>
+          </a:fillRef>
+          <a:effectRef idx="0">
+            <a:schemeClr val="accent1"/>
+          </a:effectRef>
+          <a:fontRef idx="minor">
+            <a:schemeClr val="lt1"/>
+          </a:fontRef>
+        </p:style>
+        <p:txBody>
+          <a:bodyPr rtlCol="0" anchor="ctr"/>
+          <a:lstStyle/>
+          <a:p>
+            <a:pPr algn="ctr"/>
+            <a:endParaRPr lang="en-US"/>
+          </a:p>
+        </p:txBody>
+      </p:sp>
+      <p:sp>
+        <p:nvSpPr>
+          <p:cNvPr id="1074" name="Oval 1073">
+            <a:extLst>
+              <a:ext uri="{FF2B5EF4-FFF2-40B4-BE49-F238E27FC236}">
+                <a16:creationId xmlns:a16="http://schemas.microsoft.com/office/drawing/2014/main" id="{DB2F3438-0369-D3F0-7080-76BADE052959}"/>
+              </a:ext>
+            </a:extLst>
+          </p:cNvPr>
+          <p:cNvSpPr>
+            <a:spLocks/>
+          </p:cNvSpPr>
+          <p:nvPr/>
+        </p:nvSpPr>
+        <p:spPr>
+          <a:xfrm>
+            <a:off x="6033463" y="5072931"/>
+            <a:ext cx="228600" cy="228600"/>
+          </a:xfrm>
+          <a:prstGeom prst="ellipse">
+            <a:avLst/>
+          </a:prstGeom>
+          <a:ln>
+            <a:noFill/>
+          </a:ln>
+        </p:spPr>
+        <p:style>
+          <a:lnRef idx="2">
+            <a:schemeClr val="accent1">
+              <a:shade val="15000"/>
+            </a:schemeClr>
+          </a:lnRef>
+          <a:fillRef idx="1">
+            <a:schemeClr val="accent1"/>
+          </a:fillRef>
+          <a:effectRef idx="0">
+            <a:schemeClr val="accent1"/>
+          </a:effectRef>
+          <a:fontRef idx="minor">
+            <a:schemeClr val="lt1"/>
+          </a:fontRef>
+        </p:style>
+        <p:txBody>
+          <a:bodyPr rtlCol="0" anchor="ctr"/>
+          <a:lstStyle/>
+          <a:p>
+            <a:pPr algn="ctr"/>
+            <a:endParaRPr lang="en-US"/>
+          </a:p>
+        </p:txBody>
+      </p:sp>
+      <p:sp>
+        <p:nvSpPr>
+          <p:cNvPr id="1075" name="Oval 1074">
+            <a:extLst>
+              <a:ext uri="{FF2B5EF4-FFF2-40B4-BE49-F238E27FC236}">
+                <a16:creationId xmlns:a16="http://schemas.microsoft.com/office/drawing/2014/main" id="{699C0E32-E3C0-AFEA-405A-6E57A18962E0}"/>
+              </a:ext>
+            </a:extLst>
+          </p:cNvPr>
+          <p:cNvSpPr>
+            <a:spLocks/>
+          </p:cNvSpPr>
+          <p:nvPr/>
+        </p:nvSpPr>
+        <p:spPr>
+          <a:xfrm>
+            <a:off x="7088832" y="5936456"/>
+            <a:ext cx="228600" cy="228600"/>
+          </a:xfrm>
+          <a:prstGeom prst="ellipse">
+            <a:avLst/>
+          </a:prstGeom>
+          <a:solidFill>
+            <a:schemeClr val="bg1"/>
+          </a:solidFill>
+          <a:ln w="50800">
+            <a:solidFill>
+              <a:srgbClr val="00B050"/>
+            </a:solidFill>
+          </a:ln>
+        </p:spPr>
+        <p:style>
+          <a:lnRef idx="2">
+            <a:schemeClr val="accent1">
+              <a:shade val="15000"/>
+            </a:schemeClr>
+          </a:lnRef>
+          <a:fillRef idx="1">
+            <a:schemeClr val="accent1"/>
+          </a:fillRef>
+          <a:effectRef idx="0">
+            <a:schemeClr val="accent1"/>
+          </a:effectRef>
+          <a:fontRef idx="minor">
+            <a:schemeClr val="lt1"/>
+          </a:fontRef>
+        </p:style>
+        <p:txBody>
+          <a:bodyPr rtlCol="0" anchor="ctr"/>
+          <a:lstStyle/>
+          <a:p>
+            <a:pPr algn="ctr"/>
+            <a:endParaRPr lang="en-US"/>
+          </a:p>
+        </p:txBody>
+      </p:sp>
+      <p:sp>
+        <p:nvSpPr>
+          <p:cNvPr id="1076" name="Oval 1075">
+            <a:extLst>
+              <a:ext uri="{FF2B5EF4-FFF2-40B4-BE49-F238E27FC236}">
+                <a16:creationId xmlns:a16="http://schemas.microsoft.com/office/drawing/2014/main" id="{0FBAD94F-847E-88C3-AF9C-643F51FC47A6}"/>
+              </a:ext>
+            </a:extLst>
+          </p:cNvPr>
+          <p:cNvSpPr>
+            <a:spLocks/>
+          </p:cNvSpPr>
+          <p:nvPr/>
+        </p:nvSpPr>
+        <p:spPr>
+          <a:xfrm>
+            <a:off x="6467757" y="5943600"/>
+            <a:ext cx="228600" cy="228600"/>
+          </a:xfrm>
+          <a:prstGeom prst="ellipse">
+            <a:avLst/>
+          </a:prstGeom>
+          <a:solidFill>
+            <a:schemeClr val="bg1"/>
+          </a:solidFill>
+          <a:ln w="50800">
+            <a:solidFill>
+              <a:srgbClr val="00B050"/>
+            </a:solidFill>
+          </a:ln>
+        </p:spPr>
+        <p:style>
+          <a:lnRef idx="2">
+            <a:schemeClr val="accent1">
+              <a:shade val="15000"/>
+            </a:schemeClr>
+          </a:lnRef>
+          <a:fillRef idx="1">
+            <a:schemeClr val="accent1"/>
+          </a:fillRef>
+          <a:effectRef idx="0">
+            <a:schemeClr val="accent1"/>
+          </a:effectRef>
+          <a:fontRef idx="minor">
+            <a:schemeClr val="lt1"/>
+          </a:fontRef>
+        </p:style>
+        <p:txBody>
+          <a:bodyPr rtlCol="0" anchor="ctr"/>
+          <a:lstStyle/>
+          <a:p>
+            <a:pPr algn="ctr"/>
+            <a:endParaRPr lang="en-US"/>
+          </a:p>
+        </p:txBody>
+      </p:sp>
+      <p:sp>
+        <p:nvSpPr>
+          <p:cNvPr id="1077" name="Oval 1076">
+            <a:extLst>
+              <a:ext uri="{FF2B5EF4-FFF2-40B4-BE49-F238E27FC236}">
+                <a16:creationId xmlns:a16="http://schemas.microsoft.com/office/drawing/2014/main" id="{5789A3EE-1E63-81C3-4B34-C2820604C7D9}"/>
+              </a:ext>
+            </a:extLst>
+          </p:cNvPr>
+          <p:cNvSpPr>
+            <a:spLocks/>
+          </p:cNvSpPr>
+          <p:nvPr/>
+        </p:nvSpPr>
+        <p:spPr>
+          <a:xfrm>
+            <a:off x="5780334" y="5883702"/>
+            <a:ext cx="228600" cy="228600"/>
+          </a:xfrm>
+          <a:prstGeom prst="ellipse">
+            <a:avLst/>
+          </a:prstGeom>
+          <a:solidFill>
+            <a:schemeClr val="bg1"/>
+          </a:solidFill>
+          <a:ln w="50800">
+            <a:solidFill>
+              <a:srgbClr val="00B050"/>
+            </a:solidFill>
+          </a:ln>
+        </p:spPr>
+        <p:style>
+          <a:lnRef idx="2">
+            <a:schemeClr val="accent1">
+              <a:shade val="15000"/>
+            </a:schemeClr>
+          </a:lnRef>
+          <a:fillRef idx="1">
+            <a:schemeClr val="accent1"/>
+          </a:fillRef>
+          <a:effectRef idx="0">
+            <a:schemeClr val="accent1"/>
+          </a:effectRef>
+          <a:fontRef idx="minor">
+            <a:schemeClr val="lt1"/>
+          </a:fontRef>
+        </p:style>
+        <p:txBody>
+          <a:bodyPr rtlCol="0" anchor="ctr"/>
+          <a:lstStyle/>
+          <a:p>
+            <a:pPr algn="ctr"/>
+            <a:endParaRPr lang="en-US"/>
+          </a:p>
+        </p:txBody>
+      </p:sp>
+      <p:sp>
+        <p:nvSpPr>
+          <p:cNvPr id="1078" name="Oval 1077">
+            <a:extLst>
+              <a:ext uri="{FF2B5EF4-FFF2-40B4-BE49-F238E27FC236}">
+                <a16:creationId xmlns:a16="http://schemas.microsoft.com/office/drawing/2014/main" id="{504BD39B-A6A0-F155-04B4-90039BF0FA4B}"/>
+              </a:ext>
+            </a:extLst>
+          </p:cNvPr>
+          <p:cNvSpPr>
+            <a:spLocks/>
+          </p:cNvSpPr>
+          <p:nvPr/>
+        </p:nvSpPr>
+        <p:spPr>
+          <a:xfrm>
+            <a:off x="4637175" y="5044916"/>
+            <a:ext cx="228600" cy="228600"/>
+          </a:xfrm>
+          <a:prstGeom prst="ellipse">
+            <a:avLst/>
+          </a:prstGeom>
+          <a:ln>
+            <a:noFill/>
+          </a:ln>
+        </p:spPr>
+        <p:style>
+          <a:lnRef idx="2">
+            <a:schemeClr val="accent1">
+              <a:shade val="15000"/>
+            </a:schemeClr>
+          </a:lnRef>
+          <a:fillRef idx="1">
+            <a:schemeClr val="accent1"/>
+          </a:fillRef>
+          <a:effectRef idx="0">
+            <a:schemeClr val="accent1"/>
+          </a:effectRef>
+          <a:fontRef idx="minor">
+            <a:schemeClr val="lt1"/>
+          </a:fontRef>
+        </p:style>
+        <p:txBody>
+          <a:bodyPr rtlCol="0" anchor="ctr"/>
+          <a:lstStyle/>
+          <a:p>
+            <a:pPr algn="ctr"/>
+            <a:endParaRPr lang="en-US"/>
+          </a:p>
+        </p:txBody>
+      </p:sp>
+      <p:sp>
+        <p:nvSpPr>
+          <p:cNvPr id="1079" name="Oval 1078">
+            <a:extLst>
+              <a:ext uri="{FF2B5EF4-FFF2-40B4-BE49-F238E27FC236}">
+                <a16:creationId xmlns:a16="http://schemas.microsoft.com/office/drawing/2014/main" id="{93BDE8B5-6C18-FB4D-A122-A80D60E92A74}"/>
+              </a:ext>
+            </a:extLst>
+          </p:cNvPr>
+          <p:cNvSpPr>
+            <a:spLocks/>
+          </p:cNvSpPr>
+          <p:nvPr/>
+        </p:nvSpPr>
+        <p:spPr>
+          <a:xfrm>
+            <a:off x="5481160" y="4999197"/>
+            <a:ext cx="228600" cy="228600"/>
+          </a:xfrm>
+          <a:prstGeom prst="ellipse">
+            <a:avLst/>
+          </a:prstGeom>
+          <a:ln>
+            <a:noFill/>
+          </a:ln>
+        </p:spPr>
+        <p:style>
+          <a:lnRef idx="2">
+            <a:schemeClr val="accent1">
+              <a:shade val="15000"/>
+            </a:schemeClr>
+          </a:lnRef>
+          <a:fillRef idx="1">
+            <a:schemeClr val="accent1"/>
+          </a:fillRef>
+          <a:effectRef idx="0">
+            <a:schemeClr val="accent1"/>
+          </a:effectRef>
+          <a:fontRef idx="minor">
+            <a:schemeClr val="lt1"/>
+          </a:fontRef>
+        </p:style>
+        <p:txBody>
+          <a:bodyPr rtlCol="0" anchor="ctr"/>
+          <a:lstStyle/>
+          <a:p>
+            <a:pPr algn="ctr"/>
+            <a:endParaRPr lang="en-US"/>
+          </a:p>
+        </p:txBody>
+      </p:sp>
+      <p:sp>
+        <p:nvSpPr>
+          <p:cNvPr id="1080" name="Oval 1079">
+            <a:extLst>
+              <a:ext uri="{FF2B5EF4-FFF2-40B4-BE49-F238E27FC236}">
+                <a16:creationId xmlns:a16="http://schemas.microsoft.com/office/drawing/2014/main" id="{CB3FE44F-3286-49D2-517B-4738B117124B}"/>
+              </a:ext>
+            </a:extLst>
+          </p:cNvPr>
+          <p:cNvSpPr>
+            <a:spLocks/>
+          </p:cNvSpPr>
+          <p:nvPr/>
+        </p:nvSpPr>
+        <p:spPr>
+          <a:xfrm>
+            <a:off x="6759089" y="5067778"/>
+            <a:ext cx="228600" cy="228600"/>
+          </a:xfrm>
+          <a:prstGeom prst="ellipse">
+            <a:avLst/>
+          </a:prstGeom>
+          <a:ln>
+            <a:noFill/>
+          </a:ln>
+        </p:spPr>
+        <p:style>
+          <a:lnRef idx="2">
+            <a:schemeClr val="accent1">
+              <a:shade val="15000"/>
+            </a:schemeClr>
+          </a:lnRef>
+          <a:fillRef idx="1">
+            <a:schemeClr val="accent1"/>
+          </a:fillRef>
+          <a:effectRef idx="0">
+            <a:schemeClr val="accent1"/>
+          </a:effectRef>
+          <a:fontRef idx="minor">
+            <a:schemeClr val="lt1"/>
+          </a:fontRef>
+        </p:style>
+        <p:txBody>
+          <a:bodyPr rtlCol="0" anchor="ctr"/>
+          <a:lstStyle/>
+          <a:p>
+            <a:pPr algn="ctr"/>
+            <a:endParaRPr lang="en-US"/>
+          </a:p>
+        </p:txBody>
+      </p:sp>
+      <p:sp>
+        <p:nvSpPr>
+          <p:cNvPr id="1083" name="Arrow: Right 1082">
+            <a:extLst>
+              <a:ext uri="{FF2B5EF4-FFF2-40B4-BE49-F238E27FC236}">
+                <a16:creationId xmlns:a16="http://schemas.microsoft.com/office/drawing/2014/main" id="{E1CC0C5A-AA35-F717-E9E6-528B9525432E}"/>
+              </a:ext>
+            </a:extLst>
+          </p:cNvPr>
+          <p:cNvSpPr/>
+          <p:nvPr/>
+        </p:nvSpPr>
+        <p:spPr>
+          <a:xfrm>
+            <a:off x="4446836" y="2547759"/>
+            <a:ext cx="487758" cy="228600"/>
+          </a:xfrm>
+          <a:prstGeom prst="rightArrow">
+            <a:avLst/>
+          </a:prstGeom>
+          <a:ln>
+            <a:noFill/>
+          </a:ln>
+        </p:spPr>
+        <p:style>
+          <a:lnRef idx="2">
+            <a:schemeClr val="accent1">
+              <a:shade val="15000"/>
+            </a:schemeClr>
+          </a:lnRef>
+          <a:fillRef idx="1">
+            <a:schemeClr val="accent1"/>
+          </a:fillRef>
+          <a:effectRef idx="0">
+            <a:schemeClr val="accent1"/>
+          </a:effectRef>
+          <a:fontRef idx="minor">
+            <a:schemeClr val="lt1"/>
+          </a:fontRef>
+        </p:style>
+        <p:txBody>
+          <a:bodyPr rtlCol="0" anchor="ctr"/>
+          <a:lstStyle/>
+          <a:p>
+            <a:pPr algn="ctr"/>
+            <a:endParaRPr lang="en-US"/>
+          </a:p>
+        </p:txBody>
+      </p:sp>
+    </p:spTree>
+    <p:extLst>
+      <p:ext uri="{BB962C8B-B14F-4D97-AF65-F5344CB8AC3E}">
+        <p14:creationId xmlns:p14="http://schemas.microsoft.com/office/powerpoint/2010/main" val="2523497393"/>
+      </p:ext>
+    </p:extLst>
+  </p:cSld>
+  <p:clrMapOvr>
+    <a:masterClrMapping/>
+  </p:clrMapOvr>
+</p:sld>
+</file>
+
 <file path=ppt/theme/theme1.xml><?xml version="1.0" encoding="utf-8"?>
 <a:theme xmlns:a="http://schemas.openxmlformats.org/drawingml/2006/main" name="Office Theme">
   <a:themeElements>

</xml_diff>